<commit_message>
c02s01 - Getting To Know Go (golang) - Updated docs, slides, and code sample.
</commit_message>
<xml_diff>
--- a/doc/Go-Lang-Programming.pptx
+++ b/doc/Go-Lang-Programming.pptx
@@ -8,6 +8,24 @@
     <p:sldId id="256" r:id="rId2"/>
     <p:sldId id="258" r:id="rId3"/>
     <p:sldId id="257" r:id="rId4"/>
+    <p:sldId id="259" r:id="rId5"/>
+    <p:sldId id="260" r:id="rId6"/>
+    <p:sldId id="265" r:id="rId7"/>
+    <p:sldId id="263" r:id="rId8"/>
+    <p:sldId id="266" r:id="rId9"/>
+    <p:sldId id="262" r:id="rId10"/>
+    <p:sldId id="264" r:id="rId11"/>
+    <p:sldId id="267" r:id="rId12"/>
+    <p:sldId id="271" r:id="rId13"/>
+    <p:sldId id="278" r:id="rId14"/>
+    <p:sldId id="272" r:id="rId15"/>
+    <p:sldId id="276" r:id="rId16"/>
+    <p:sldId id="277" r:id="rId17"/>
+    <p:sldId id="273" r:id="rId18"/>
+    <p:sldId id="270" r:id="rId19"/>
+    <p:sldId id="269" r:id="rId20"/>
+    <p:sldId id="274" r:id="rId21"/>
+    <p:sldId id="275" r:id="rId22"/>
   </p:sldIdLst>
   <p:sldSz cx="9144000" cy="6858000" type="screen4x3"/>
   <p:notesSz cx="6858000" cy="9144000"/>
@@ -1675,6 +1693,13 @@
         </dgm:presLayoutVars>
       </dgm:prSet>
       <dgm:spPr/>
+      <dgm:t>
+        <a:bodyPr/>
+        <a:lstStyle/>
+        <a:p>
+          <a:endParaRPr lang="en-US"/>
+        </a:p>
+      </dgm:t>
     </dgm:pt>
     <dgm:pt modelId="{B6677861-2891-E74C-B5FE-6B1255E725F3}" type="pres">
       <dgm:prSet presAssocID="{205327B6-FC01-EC49-854D-EA8671E264FA}" presName="hierFlow" presStyleCnt="0"/>
@@ -1720,6 +1745,13 @@
     <dgm:pt modelId="{B0C68508-B541-974F-A809-2BAE5EB45307}" type="pres">
       <dgm:prSet presAssocID="{F47DF6A6-531D-EC48-9DE7-05637534813C}" presName="Name19" presStyleLbl="parChTrans1D2" presStyleIdx="0" presStyleCnt="3"/>
       <dgm:spPr/>
+      <dgm:t>
+        <a:bodyPr/>
+        <a:lstStyle/>
+        <a:p>
+          <a:endParaRPr lang="en-US"/>
+        </a:p>
+      </dgm:t>
     </dgm:pt>
     <dgm:pt modelId="{CD82DE1A-7C81-674D-B47D-AFBC59BAA3FF}" type="pres">
       <dgm:prSet presAssocID="{608E358A-379B-1946-AE72-CC239B5EF8F3}" presName="Name21" presStyleCnt="0"/>
@@ -1728,6 +1760,13 @@
     <dgm:pt modelId="{E740D58E-D5D4-8245-B250-FA07771DA4E7}" type="pres">
       <dgm:prSet presAssocID="{608E358A-379B-1946-AE72-CC239B5EF8F3}" presName="level2Shape" presStyleLbl="node2" presStyleIdx="0" presStyleCnt="3"/>
       <dgm:spPr/>
+      <dgm:t>
+        <a:bodyPr/>
+        <a:lstStyle/>
+        <a:p>
+          <a:endParaRPr lang="en-US"/>
+        </a:p>
+      </dgm:t>
     </dgm:pt>
     <dgm:pt modelId="{FCC4DDE1-11D1-2140-94B4-2ED457277447}" type="pres">
       <dgm:prSet presAssocID="{608E358A-379B-1946-AE72-CC239B5EF8F3}" presName="hierChild3" presStyleCnt="0"/>
@@ -1736,6 +1775,13 @@
     <dgm:pt modelId="{166884DE-BE24-4743-9A1F-F0EAF6E40032}" type="pres">
       <dgm:prSet presAssocID="{7095DB50-6F7B-224E-A0CF-6B8680E8D571}" presName="Name19" presStyleLbl="parChTrans1D3" presStyleIdx="0" presStyleCnt="2"/>
       <dgm:spPr/>
+      <dgm:t>
+        <a:bodyPr/>
+        <a:lstStyle/>
+        <a:p>
+          <a:endParaRPr lang="en-US"/>
+        </a:p>
+      </dgm:t>
     </dgm:pt>
     <dgm:pt modelId="{E89AFFBD-1278-0A49-9C34-ACB587432119}" type="pres">
       <dgm:prSet presAssocID="{325CD322-470C-7A48-9D4E-7ACA2469EBB4}" presName="Name21" presStyleCnt="0"/>
@@ -1744,6 +1790,13 @@
     <dgm:pt modelId="{E63A20C7-A4FA-6C40-80EA-8703ADA953B8}" type="pres">
       <dgm:prSet presAssocID="{325CD322-470C-7A48-9D4E-7ACA2469EBB4}" presName="level2Shape" presStyleLbl="node3" presStyleIdx="0" presStyleCnt="2"/>
       <dgm:spPr/>
+      <dgm:t>
+        <a:bodyPr/>
+        <a:lstStyle/>
+        <a:p>
+          <a:endParaRPr lang="en-US"/>
+        </a:p>
+      </dgm:t>
     </dgm:pt>
     <dgm:pt modelId="{690DDCD1-ED00-274F-A94E-A8697EB3B455}" type="pres">
       <dgm:prSet presAssocID="{325CD322-470C-7A48-9D4E-7ACA2469EBB4}" presName="hierChild3" presStyleCnt="0"/>
@@ -1752,6 +1805,13 @@
     <dgm:pt modelId="{50C4A1F8-96EC-1F43-BA6F-F2259104C41F}" type="pres">
       <dgm:prSet presAssocID="{46E8F01F-92FD-7047-906D-780679CDAB39}" presName="Name19" presStyleLbl="parChTrans1D4" presStyleIdx="0" presStyleCnt="8"/>
       <dgm:spPr/>
+      <dgm:t>
+        <a:bodyPr/>
+        <a:lstStyle/>
+        <a:p>
+          <a:endParaRPr lang="en-US"/>
+        </a:p>
+      </dgm:t>
     </dgm:pt>
     <dgm:pt modelId="{0FA76D3E-F17F-0D4C-B9C8-B55294933231}" type="pres">
       <dgm:prSet presAssocID="{962458F7-A819-BC42-9C5E-BE9345296B67}" presName="Name21" presStyleCnt="0"/>
@@ -1775,6 +1835,13 @@
     <dgm:pt modelId="{19487793-57C2-374A-879F-E696F530DB02}" type="pres">
       <dgm:prSet presAssocID="{44CBA9EA-E09E-694E-8325-0E5B9A3A127E}" presName="Name19" presStyleLbl="parChTrans1D4" presStyleIdx="1" presStyleCnt="8"/>
       <dgm:spPr/>
+      <dgm:t>
+        <a:bodyPr/>
+        <a:lstStyle/>
+        <a:p>
+          <a:endParaRPr lang="en-US"/>
+        </a:p>
+      </dgm:t>
     </dgm:pt>
     <dgm:pt modelId="{47D91629-D395-D64C-AEE3-62B982282215}" type="pres">
       <dgm:prSet presAssocID="{09436980-886A-A144-B28F-4F95DE6D053F}" presName="Name21" presStyleCnt="0"/>
@@ -1798,6 +1865,13 @@
     <dgm:pt modelId="{0749EE12-1614-D34F-95BC-9FD994DB0A6B}" type="pres">
       <dgm:prSet presAssocID="{E4DA86CD-61E9-0F42-9AAD-DE68BB514C65}" presName="Name19" presStyleLbl="parChTrans1D4" presStyleIdx="2" presStyleCnt="8"/>
       <dgm:spPr/>
+      <dgm:t>
+        <a:bodyPr/>
+        <a:lstStyle/>
+        <a:p>
+          <a:endParaRPr lang="en-US"/>
+        </a:p>
+      </dgm:t>
     </dgm:pt>
     <dgm:pt modelId="{2057933A-190E-C842-B545-C7A6A005EA7B}" type="pres">
       <dgm:prSet presAssocID="{416BC2AF-E413-8F42-97B0-99AEE685CEE3}" presName="Name21" presStyleCnt="0"/>
@@ -1821,6 +1895,13 @@
     <dgm:pt modelId="{B51CD7DC-1830-E34E-BABF-5600D92A8EC9}" type="pres">
       <dgm:prSet presAssocID="{996D3EC6-39C6-6B45-A4A9-1998BF7844CD}" presName="Name19" presStyleLbl="parChTrans1D4" presStyleIdx="3" presStyleCnt="8"/>
       <dgm:spPr/>
+      <dgm:t>
+        <a:bodyPr/>
+        <a:lstStyle/>
+        <a:p>
+          <a:endParaRPr lang="en-US"/>
+        </a:p>
+      </dgm:t>
     </dgm:pt>
     <dgm:pt modelId="{4F88E219-ADC3-F54E-9CB0-257C7F1FA9A6}" type="pres">
       <dgm:prSet presAssocID="{C22EDB81-4EE8-AE4C-AB1C-049A8DA3E918}" presName="Name21" presStyleCnt="0"/>
@@ -1844,6 +1925,13 @@
     <dgm:pt modelId="{D3F96F7F-FB1D-0946-8900-D7DA7DA026C7}" type="pres">
       <dgm:prSet presAssocID="{82D3ED4D-5C25-7544-B22F-B85C8F1A2810}" presName="Name19" presStyleLbl="parChTrans1D3" presStyleIdx="1" presStyleCnt="2"/>
       <dgm:spPr/>
+      <dgm:t>
+        <a:bodyPr/>
+        <a:lstStyle/>
+        <a:p>
+          <a:endParaRPr lang="en-US"/>
+        </a:p>
+      </dgm:t>
     </dgm:pt>
     <dgm:pt modelId="{82290B23-9A85-AB47-8B88-54EB0DD1727C}" type="pres">
       <dgm:prSet presAssocID="{91760BCA-8824-054A-8255-CF295C0007C7}" presName="Name21" presStyleCnt="0"/>
@@ -1867,6 +1955,13 @@
     <dgm:pt modelId="{7E354305-1666-DE40-85C2-BA948E95C27F}" type="pres">
       <dgm:prSet presAssocID="{E37B0138-6AF3-0A47-AD29-5D1AB5FEA739}" presName="Name19" presStyleLbl="parChTrans1D4" presStyleIdx="4" presStyleCnt="8"/>
       <dgm:spPr/>
+      <dgm:t>
+        <a:bodyPr/>
+        <a:lstStyle/>
+        <a:p>
+          <a:endParaRPr lang="en-US"/>
+        </a:p>
+      </dgm:t>
     </dgm:pt>
     <dgm:pt modelId="{A155A67F-625D-F746-8F9B-9027C6E0AA34}" type="pres">
       <dgm:prSet presAssocID="{321B3F82-7C36-B44F-BBBD-E24FDC2F7532}" presName="Name21" presStyleCnt="0"/>
@@ -1890,6 +1985,13 @@
     <dgm:pt modelId="{24785C53-E048-2F49-95E5-50BA01B35473}" type="pres">
       <dgm:prSet presAssocID="{0C71533C-D855-8641-8AF2-2EEDC09AFC8B}" presName="Name19" presStyleLbl="parChTrans1D4" presStyleIdx="5" presStyleCnt="8"/>
       <dgm:spPr/>
+      <dgm:t>
+        <a:bodyPr/>
+        <a:lstStyle/>
+        <a:p>
+          <a:endParaRPr lang="en-US"/>
+        </a:p>
+      </dgm:t>
     </dgm:pt>
     <dgm:pt modelId="{EB4684CF-C789-FA4A-9ACD-07ED21ECD299}" type="pres">
       <dgm:prSet presAssocID="{22AF1D18-4985-D64D-AE8A-D4046B8CC830}" presName="Name21" presStyleCnt="0"/>
@@ -1913,6 +2015,13 @@
     <dgm:pt modelId="{521E9FC3-0242-3B42-9B09-24880D5F4B25}" type="pres">
       <dgm:prSet presAssocID="{C71BF077-42C0-4948-9588-890114675F02}" presName="Name19" presStyleLbl="parChTrans1D4" presStyleIdx="6" presStyleCnt="8"/>
       <dgm:spPr/>
+      <dgm:t>
+        <a:bodyPr/>
+        <a:lstStyle/>
+        <a:p>
+          <a:endParaRPr lang="en-US"/>
+        </a:p>
+      </dgm:t>
     </dgm:pt>
     <dgm:pt modelId="{00931678-D324-A548-8A98-AF16AF7B58E5}" type="pres">
       <dgm:prSet presAssocID="{371319CD-2491-A948-8A8E-0DD1626AA890}" presName="Name21" presStyleCnt="0"/>
@@ -1936,6 +2045,13 @@
     <dgm:pt modelId="{F2AC8BF6-11F8-C04E-BAE1-EB5935D23DFA}" type="pres">
       <dgm:prSet presAssocID="{75F21126-477E-EE4A-AF97-EAA8161FE5B7}" presName="Name19" presStyleLbl="parChTrans1D4" presStyleIdx="7" presStyleCnt="8"/>
       <dgm:spPr/>
+      <dgm:t>
+        <a:bodyPr/>
+        <a:lstStyle/>
+        <a:p>
+          <a:endParaRPr lang="en-US"/>
+        </a:p>
+      </dgm:t>
     </dgm:pt>
     <dgm:pt modelId="{B67E852C-BBF4-7A43-8F9D-24040387742C}" type="pres">
       <dgm:prSet presAssocID="{4D9B0028-A5CB-1545-B6C2-0DF8FBB42331}" presName="Name21" presStyleCnt="0"/>
@@ -1959,6 +2075,13 @@
     <dgm:pt modelId="{B62AA9A1-5F54-6045-8971-275A9DD1F0C1}" type="pres">
       <dgm:prSet presAssocID="{50CBA1FC-6347-2846-AF79-1424A3512445}" presName="Name19" presStyleLbl="parChTrans1D2" presStyleIdx="1" presStyleCnt="3"/>
       <dgm:spPr/>
+      <dgm:t>
+        <a:bodyPr/>
+        <a:lstStyle/>
+        <a:p>
+          <a:endParaRPr lang="en-US"/>
+        </a:p>
+      </dgm:t>
     </dgm:pt>
     <dgm:pt modelId="{3E7CFC5F-4637-4B42-8418-30544DE10AE5}" type="pres">
       <dgm:prSet presAssocID="{0EE8A2AC-D7AB-F147-9871-FFA55601AB0B}" presName="Name21" presStyleCnt="0"/>
@@ -1967,6 +2090,13 @@
     <dgm:pt modelId="{005E0CBE-FFBC-D141-A7F3-59239AA6108B}" type="pres">
       <dgm:prSet presAssocID="{0EE8A2AC-D7AB-F147-9871-FFA55601AB0B}" presName="level2Shape" presStyleLbl="node2" presStyleIdx="1" presStyleCnt="3"/>
       <dgm:spPr/>
+      <dgm:t>
+        <a:bodyPr/>
+        <a:lstStyle/>
+        <a:p>
+          <a:endParaRPr lang="en-US"/>
+        </a:p>
+      </dgm:t>
     </dgm:pt>
     <dgm:pt modelId="{86C0F848-F4B8-1644-BCFD-2FEE98E2D271}" type="pres">
       <dgm:prSet presAssocID="{0EE8A2AC-D7AB-F147-9871-FFA55601AB0B}" presName="hierChild3" presStyleCnt="0"/>
@@ -1975,6 +2105,13 @@
     <dgm:pt modelId="{F14A70CF-49E7-814A-8E8C-5DD5E1313154}" type="pres">
       <dgm:prSet presAssocID="{E2865FB9-7F1F-D643-AC0C-44EDE2FF6B97}" presName="Name19" presStyleLbl="parChTrans1D2" presStyleIdx="2" presStyleCnt="3"/>
       <dgm:spPr/>
+      <dgm:t>
+        <a:bodyPr/>
+        <a:lstStyle/>
+        <a:p>
+          <a:endParaRPr lang="en-US"/>
+        </a:p>
+      </dgm:t>
     </dgm:pt>
     <dgm:pt modelId="{15A89E4C-ED73-4545-8EEF-0600C1D26113}" type="pres">
       <dgm:prSet presAssocID="{703FD60E-A437-1447-A0F1-6BD0FA73D199}" presName="Name21" presStyleCnt="0"/>
@@ -1983,6 +2120,13 @@
     <dgm:pt modelId="{5E488235-E94B-F641-966B-B66ED4EF89F2}" type="pres">
       <dgm:prSet presAssocID="{703FD60E-A437-1447-A0F1-6BD0FA73D199}" presName="level2Shape" presStyleLbl="node2" presStyleIdx="2" presStyleCnt="3"/>
       <dgm:spPr/>
+      <dgm:t>
+        <a:bodyPr/>
+        <a:lstStyle/>
+        <a:p>
+          <a:endParaRPr lang="en-US"/>
+        </a:p>
+      </dgm:t>
     </dgm:pt>
     <dgm:pt modelId="{13D4F62A-34A2-8742-9AF4-DE31C0320CD4}" type="pres">
       <dgm:prSet presAssocID="{703FD60E-A437-1447-A0F1-6BD0FA73D199}" presName="hierChild3" presStyleCnt="0"/>
@@ -2074,8 +2218,8 @@
     <dgm:cxn modelId="{05198B2A-7770-454B-96C0-50A39DA69772}" type="presOf" srcId="{4C2B2C50-ABE4-B84D-A688-481FD0ABEC5B}" destId="{B77C5288-8CCD-3647-9480-02142858B552}" srcOrd="1" destOrd="0" presId="urn:microsoft.com/office/officeart/2005/8/layout/hierarchy6"/>
     <dgm:cxn modelId="{89175F31-B90A-A545-A876-9D492A091939}" type="presOf" srcId="{91760BCA-8824-054A-8255-CF295C0007C7}" destId="{D0E04C35-AADA-C041-A3A4-8351AC97C02E}" srcOrd="0" destOrd="0" presId="urn:microsoft.com/office/officeart/2005/8/layout/hierarchy6"/>
     <dgm:cxn modelId="{E13834D8-8809-AD44-8EFD-8C79C210D826}" type="presOf" srcId="{AED0620F-3A1C-C44A-B861-8182440FCFF3}" destId="{E7EC85A1-E3F8-BF45-9DCF-9A8BCADD8BEE}" srcOrd="1" destOrd="0" presId="urn:microsoft.com/office/officeart/2005/8/layout/hierarchy6"/>
+    <dgm:cxn modelId="{53842E0C-4B3F-F141-9B00-01FD306E262A}" type="presOf" srcId="{E2865FB9-7F1F-D643-AC0C-44EDE2FF6B97}" destId="{F14A70CF-49E7-814A-8E8C-5DD5E1313154}" srcOrd="0" destOrd="0" presId="urn:microsoft.com/office/officeart/2005/8/layout/hierarchy6"/>
     <dgm:cxn modelId="{3D95DD73-1705-9E44-A53D-E5A17A90AAC7}" srcId="{321B3F82-7C36-B44F-BBBD-E24FDC2F7532}" destId="{371319CD-2491-A948-8A8E-0DD1626AA890}" srcOrd="1" destOrd="0" parTransId="{C71BF077-42C0-4948-9588-890114675F02}" sibTransId="{72454DB4-4FC9-044B-BB1E-E65C501F67D2}"/>
-    <dgm:cxn modelId="{53842E0C-4B3F-F141-9B00-01FD306E262A}" type="presOf" srcId="{E2865FB9-7F1F-D643-AC0C-44EDE2FF6B97}" destId="{F14A70CF-49E7-814A-8E8C-5DD5E1313154}" srcOrd="0" destOrd="0" presId="urn:microsoft.com/office/officeart/2005/8/layout/hierarchy6"/>
     <dgm:cxn modelId="{7E3BE6C7-9FCA-6A4E-B5E3-BCCCDFDC94C2}" type="presOf" srcId="{75F21126-477E-EE4A-AF97-EAA8161FE5B7}" destId="{F2AC8BF6-11F8-C04E-BAE1-EB5935D23DFA}" srcOrd="0" destOrd="0" presId="urn:microsoft.com/office/officeart/2005/8/layout/hierarchy6"/>
     <dgm:cxn modelId="{554F7ED4-E14E-AF44-9AD2-3F5E1C71C48E}" type="presOf" srcId="{4C2B2C50-ABE4-B84D-A688-481FD0ABEC5B}" destId="{44846745-2ECE-2F43-9165-960C73D62215}" srcOrd="0" destOrd="0" presId="urn:microsoft.com/office/officeart/2005/8/layout/hierarchy6"/>
     <dgm:cxn modelId="{573143A0-F45E-294B-B14F-49BEA441002B}" srcId="{1EA921DD-DC96-F44A-A3C3-6C3141F4CAAE}" destId="{0EE8A2AC-D7AB-F147-9871-FFA55601AB0B}" srcOrd="1" destOrd="0" parTransId="{50CBA1FC-6347-2846-AF79-1424A3512445}" sibTransId="{17385550-9596-8340-85A5-36B5F4BFC632}"/>
@@ -2083,8 +2227,8 @@
     <dgm:cxn modelId="{16A6D086-2D88-D947-89A5-E36B288E81AC}" srcId="{91760BCA-8824-054A-8255-CF295C0007C7}" destId="{321B3F82-7C36-B44F-BBBD-E24FDC2F7532}" srcOrd="0" destOrd="0" parTransId="{E37B0138-6AF3-0A47-AD29-5D1AB5FEA739}" sibTransId="{F14F7457-9506-4343-AF2F-DF7328DEE565}"/>
     <dgm:cxn modelId="{2CD63128-68DB-5F4B-8AC8-1D75A7499ACF}" srcId="{325CD322-470C-7A48-9D4E-7ACA2469EBB4}" destId="{962458F7-A819-BC42-9C5E-BE9345296B67}" srcOrd="0" destOrd="0" parTransId="{46E8F01F-92FD-7047-906D-780679CDAB39}" sibTransId="{8C7C9916-A3AA-9041-B474-1CE6B704D6A7}"/>
     <dgm:cxn modelId="{C957E252-77FD-3B41-AE19-E1D33F023B4A}" type="presOf" srcId="{C71BF077-42C0-4948-9588-890114675F02}" destId="{521E9FC3-0242-3B42-9B09-24880D5F4B25}" srcOrd="0" destOrd="0" presId="urn:microsoft.com/office/officeart/2005/8/layout/hierarchy6"/>
+    <dgm:cxn modelId="{216BB9DB-28FB-9940-A3D0-D7C66910B77A}" srcId="{91760BCA-8824-054A-8255-CF295C0007C7}" destId="{4D9B0028-A5CB-1545-B6C2-0DF8FBB42331}" srcOrd="1" destOrd="0" parTransId="{75F21126-477E-EE4A-AF97-EAA8161FE5B7}" sibTransId="{F99BF771-07CD-C344-A10B-DCCAFD0C156D}"/>
     <dgm:cxn modelId="{6CD45495-3579-AF45-B139-D8ABFDA070BD}" type="presOf" srcId="{44CBA9EA-E09E-694E-8325-0E5B9A3A127E}" destId="{19487793-57C2-374A-879F-E696F530DB02}" srcOrd="0" destOrd="0" presId="urn:microsoft.com/office/officeart/2005/8/layout/hierarchy6"/>
-    <dgm:cxn modelId="{216BB9DB-28FB-9940-A3D0-D7C66910B77A}" srcId="{91760BCA-8824-054A-8255-CF295C0007C7}" destId="{4D9B0028-A5CB-1545-B6C2-0DF8FBB42331}" srcOrd="1" destOrd="0" parTransId="{75F21126-477E-EE4A-AF97-EAA8161FE5B7}" sibTransId="{F99BF771-07CD-C344-A10B-DCCAFD0C156D}"/>
     <dgm:cxn modelId="{D34CBDEE-0384-C44E-96C4-93A5099F3EF7}" type="presOf" srcId="{996D3EC6-39C6-6B45-A4A9-1998BF7844CD}" destId="{B51CD7DC-1830-E34E-BABF-5600D92A8EC9}" srcOrd="0" destOrd="0" presId="urn:microsoft.com/office/officeart/2005/8/layout/hierarchy6"/>
     <dgm:cxn modelId="{41E4C59E-7CE2-6945-8986-8666792C8BAC}" srcId="{608E358A-379B-1946-AE72-CC239B5EF8F3}" destId="{91760BCA-8824-054A-8255-CF295C0007C7}" srcOrd="1" destOrd="0" parTransId="{82D3ED4D-5C25-7544-B22F-B85C8F1A2810}" sibTransId="{BF055081-B671-5848-908B-B8C1C6F90DCE}"/>
     <dgm:cxn modelId="{DA5DA1AF-FF70-0C4A-8160-811518726368}" srcId="{321B3F82-7C36-B44F-BBBD-E24FDC2F7532}" destId="{22AF1D18-4985-D64D-AE8A-D4046B8CC830}" srcOrd="0" destOrd="0" parTransId="{0C71533C-D855-8641-8AF2-2EEDC09AFC8B}" sibTransId="{2A51E3DD-FCE1-CA42-B346-055BDD11C2D5}"/>
@@ -6041,7 +6185,7 @@
           <a:p>
             <a:fld id="{AD82BD4C-ED20-EB4D-B379-5B505F7F885F}" type="datetimeFigureOut">
               <a:rPr lang="en-US" smtClean="0"/>
-              <a:t>8/19/16</a:t>
+              <a:t>9/3/16</a:t>
             </a:fld>
             <a:endParaRPr lang="en-US"/>
           </a:p>
@@ -6211,7 +6355,7 @@
           <a:p>
             <a:fld id="{AD82BD4C-ED20-EB4D-B379-5B505F7F885F}" type="datetimeFigureOut">
               <a:rPr lang="en-US" smtClean="0"/>
-              <a:t>8/19/16</a:t>
+              <a:t>9/3/16</a:t>
             </a:fld>
             <a:endParaRPr lang="en-US"/>
           </a:p>
@@ -6391,7 +6535,7 @@
           <a:p>
             <a:fld id="{AD82BD4C-ED20-EB4D-B379-5B505F7F885F}" type="datetimeFigureOut">
               <a:rPr lang="en-US" smtClean="0"/>
-              <a:t>8/19/16</a:t>
+              <a:t>9/3/16</a:t>
             </a:fld>
             <a:endParaRPr lang="en-US"/>
           </a:p>
@@ -6561,7 +6705,7 @@
           <a:p>
             <a:fld id="{AD82BD4C-ED20-EB4D-B379-5B505F7F885F}" type="datetimeFigureOut">
               <a:rPr lang="en-US" smtClean="0"/>
-              <a:t>8/19/16</a:t>
+              <a:t>9/3/16</a:t>
             </a:fld>
             <a:endParaRPr lang="en-US"/>
           </a:p>
@@ -6807,7 +6951,7 @@
           <a:p>
             <a:fld id="{AD82BD4C-ED20-EB4D-B379-5B505F7F885F}" type="datetimeFigureOut">
               <a:rPr lang="en-US" smtClean="0"/>
-              <a:t>8/19/16</a:t>
+              <a:t>9/3/16</a:t>
             </a:fld>
             <a:endParaRPr lang="en-US"/>
           </a:p>
@@ -7095,7 +7239,7 @@
           <a:p>
             <a:fld id="{AD82BD4C-ED20-EB4D-B379-5B505F7F885F}" type="datetimeFigureOut">
               <a:rPr lang="en-US" smtClean="0"/>
-              <a:t>8/19/16</a:t>
+              <a:t>9/3/16</a:t>
             </a:fld>
             <a:endParaRPr lang="en-US"/>
           </a:p>
@@ -7517,7 +7661,7 @@
           <a:p>
             <a:fld id="{AD82BD4C-ED20-EB4D-B379-5B505F7F885F}" type="datetimeFigureOut">
               <a:rPr lang="en-US" smtClean="0"/>
-              <a:t>8/19/16</a:t>
+              <a:t>9/3/16</a:t>
             </a:fld>
             <a:endParaRPr lang="en-US"/>
           </a:p>
@@ -7635,7 +7779,7 @@
           <a:p>
             <a:fld id="{AD82BD4C-ED20-EB4D-B379-5B505F7F885F}" type="datetimeFigureOut">
               <a:rPr lang="en-US" smtClean="0"/>
-              <a:t>8/19/16</a:t>
+              <a:t>9/3/16</a:t>
             </a:fld>
             <a:endParaRPr lang="en-US"/>
           </a:p>
@@ -7730,7 +7874,7 @@
           <a:p>
             <a:fld id="{AD82BD4C-ED20-EB4D-B379-5B505F7F885F}" type="datetimeFigureOut">
               <a:rPr lang="en-US" smtClean="0"/>
-              <a:t>8/19/16</a:t>
+              <a:t>9/3/16</a:t>
             </a:fld>
             <a:endParaRPr lang="en-US"/>
           </a:p>
@@ -8007,7 +8151,7 @@
           <a:p>
             <a:fld id="{AD82BD4C-ED20-EB4D-B379-5B505F7F885F}" type="datetimeFigureOut">
               <a:rPr lang="en-US" smtClean="0"/>
-              <a:t>8/19/16</a:t>
+              <a:t>9/3/16</a:t>
             </a:fld>
             <a:endParaRPr lang="en-US"/>
           </a:p>
@@ -8260,7 +8404,7 @@
           <a:p>
             <a:fld id="{AD82BD4C-ED20-EB4D-B379-5B505F7F885F}" type="datetimeFigureOut">
               <a:rPr lang="en-US" smtClean="0"/>
-              <a:t>8/19/16</a:t>
+              <a:t>9/3/16</a:t>
             </a:fld>
             <a:endParaRPr lang="en-US"/>
           </a:p>
@@ -8473,7 +8617,7 @@
           <a:p>
             <a:fld id="{AD82BD4C-ED20-EB4D-B379-5B505F7F885F}" type="datetimeFigureOut">
               <a:rPr lang="en-US" smtClean="0"/>
-              <a:t>8/19/16</a:t>
+              <a:t>9/3/16</a:t>
             </a:fld>
             <a:endParaRPr lang="en-US"/>
           </a:p>
@@ -8915,6 +9059,1575 @@
 </p:sld>
 </file>
 
+<file path=ppt/slides/slide10.xml><?xml version="1.0" encoding="utf-8"?>
+<p:sld xmlns:a="http://schemas.openxmlformats.org/drawingml/2006/main" xmlns:r="http://schemas.openxmlformats.org/officeDocument/2006/relationships" xmlns:p="http://schemas.openxmlformats.org/presentationml/2006/main">
+  <p:cSld>
+    <p:spTree>
+      <p:nvGrpSpPr>
+        <p:cNvPr id="1" name=""/>
+        <p:cNvGrpSpPr/>
+        <p:nvPr/>
+      </p:nvGrpSpPr>
+      <p:grpSpPr>
+        <a:xfrm>
+          <a:off x="0" y="0"/>
+          <a:ext cx="0" cy="0"/>
+          <a:chOff x="0" y="0"/>
+          <a:chExt cx="0" cy="0"/>
+        </a:xfrm>
+      </p:grpSpPr>
+      <p:sp>
+        <p:nvSpPr>
+          <p:cNvPr id="2" name="Title 1"/>
+          <p:cNvSpPr>
+            <a:spLocks noGrp="1"/>
+          </p:cNvSpPr>
+          <p:nvPr>
+            <p:ph type="title"/>
+          </p:nvPr>
+        </p:nvSpPr>
+        <p:spPr/>
+        <p:txBody>
+          <a:bodyPr/>
+          <a:lstStyle/>
+          <a:p>
+            <a:r>
+              <a:rPr lang="en-US" dirty="0" smtClean="0"/>
+              <a:t>Linux Installation</a:t>
+            </a:r>
+            <a:endParaRPr lang="en-US" dirty="0"/>
+          </a:p>
+        </p:txBody>
+      </p:sp>
+      <p:sp>
+        <p:nvSpPr>
+          <p:cNvPr id="3" name="Content Placeholder 2"/>
+          <p:cNvSpPr>
+            <a:spLocks noGrp="1"/>
+          </p:cNvSpPr>
+          <p:nvPr>
+            <p:ph idx="1"/>
+          </p:nvPr>
+        </p:nvSpPr>
+        <p:spPr/>
+        <p:txBody>
+          <a:bodyPr>
+            <a:normAutofit fontScale="85000" lnSpcReduction="10000"/>
+          </a:bodyPr>
+          <a:lstStyle/>
+          <a:p>
+            <a:pPr marL="514350" indent="-514350">
+              <a:buFont typeface="+mj-lt"/>
+              <a:buAutoNum type="arabicPeriod"/>
+            </a:pPr>
+            <a:r>
+              <a:rPr lang="en-US" dirty="0"/>
+              <a:t>Download the ‘Required Software’ for your platform:</a:t>
+            </a:r>
+          </a:p>
+          <a:p>
+            <a:pPr marL="514350" indent="-514350">
+              <a:buFont typeface="+mj-lt"/>
+              <a:buAutoNum type="arabicPeriod"/>
+            </a:pPr>
+            <a:r>
+              <a:rPr lang="en-US" dirty="0" smtClean="0"/>
+              <a:t>Install </a:t>
+            </a:r>
+            <a:r>
+              <a:rPr lang="en-US" dirty="0" err="1" smtClean="0"/>
+              <a:t>Git</a:t>
+            </a:r>
+            <a:endParaRPr lang="en-US" dirty="0" smtClean="0"/>
+          </a:p>
+          <a:p>
+            <a:pPr marL="914400" lvl="1" indent="-514350"/>
+            <a:r>
+              <a:rPr lang="en-US" dirty="0" smtClean="0"/>
+              <a:t>Create a .</a:t>
+            </a:r>
+            <a:r>
+              <a:rPr lang="en-US" dirty="0" err="1" smtClean="0"/>
+              <a:t>gitconfig</a:t>
+            </a:r>
+            <a:r>
+              <a:rPr lang="en-US" dirty="0" smtClean="0"/>
+              <a:t> file in $HOME/.</a:t>
+            </a:r>
+            <a:r>
+              <a:rPr lang="en-US" dirty="0" err="1" smtClean="0"/>
+              <a:t>gitconf</a:t>
+            </a:r>
+            <a:r>
+              <a:rPr lang="en-US" dirty="0" smtClean="0"/>
+              <a:t>:</a:t>
+            </a:r>
+          </a:p>
+          <a:p>
+            <a:pPr marL="1314450" lvl="2" indent="-514350"/>
+            <a:r>
+              <a:rPr lang="en-US" dirty="0" smtClean="0"/>
+              <a:t>$ </a:t>
+            </a:r>
+            <a:r>
+              <a:rPr lang="en-US" dirty="0" err="1" smtClean="0"/>
+              <a:t>git</a:t>
+            </a:r>
+            <a:r>
+              <a:rPr lang="en-US" dirty="0" smtClean="0"/>
+              <a:t> </a:t>
+            </a:r>
+            <a:r>
+              <a:rPr lang="en-US" dirty="0" err="1" smtClean="0"/>
+              <a:t>config</a:t>
+            </a:r>
+            <a:r>
+              <a:rPr lang="en-US" dirty="0" smtClean="0"/>
+              <a:t> --global </a:t>
+            </a:r>
+            <a:r>
+              <a:rPr lang="en-US" dirty="0" err="1" smtClean="0"/>
+              <a:t>user.email</a:t>
+            </a:r>
+            <a:r>
+              <a:rPr lang="en-US" dirty="0" smtClean="0"/>
+              <a:t> </a:t>
+            </a:r>
+            <a:r>
+              <a:rPr lang="en-US" dirty="0" smtClean="0">
+                <a:hlinkClick r:id="rId2"/>
+              </a:rPr>
+              <a:t>“your@email.com</a:t>
+            </a:r>
+            <a:r>
+              <a:rPr lang="en-US" dirty="0" smtClean="0"/>
+              <a:t>”</a:t>
+            </a:r>
+          </a:p>
+          <a:p>
+            <a:pPr marL="1314450" lvl="2" indent="-514350"/>
+            <a:r>
+              <a:rPr lang="en-US" dirty="0" smtClean="0"/>
+              <a:t>$ </a:t>
+            </a:r>
+            <a:r>
+              <a:rPr lang="en-US" dirty="0" err="1" smtClean="0"/>
+              <a:t>git</a:t>
+            </a:r>
+            <a:r>
+              <a:rPr lang="en-US" dirty="0" smtClean="0"/>
+              <a:t> </a:t>
+            </a:r>
+            <a:r>
+              <a:rPr lang="en-US" dirty="0" err="1" smtClean="0"/>
+              <a:t>config</a:t>
+            </a:r>
+            <a:r>
+              <a:rPr lang="en-US" dirty="0" smtClean="0"/>
+              <a:t> --global </a:t>
+            </a:r>
+            <a:r>
+              <a:rPr lang="en-US" dirty="0" err="1" smtClean="0"/>
+              <a:t>user.name</a:t>
+            </a:r>
+            <a:r>
+              <a:rPr lang="en-US" dirty="0" smtClean="0"/>
+              <a:t> “your name”</a:t>
+            </a:r>
+          </a:p>
+          <a:p>
+            <a:pPr marL="514350" indent="-514350">
+              <a:buFont typeface="+mj-lt"/>
+              <a:buAutoNum type="arabicPeriod"/>
+            </a:pPr>
+            <a:r>
+              <a:rPr lang="en-US" dirty="0" smtClean="0"/>
+              <a:t>Install Go tools</a:t>
+            </a:r>
+          </a:p>
+          <a:p>
+            <a:pPr marL="914400" lvl="1" indent="-514350">
+              <a:buFont typeface="+mj-lt"/>
+              <a:buAutoNum type="arabicPeriod"/>
+            </a:pPr>
+            <a:r>
+              <a:rPr lang="en-US" dirty="0" smtClean="0"/>
+              <a:t>Create GOPATH home directory</a:t>
+            </a:r>
+          </a:p>
+          <a:p>
+            <a:pPr marL="1314450" lvl="2" indent="-514350"/>
+            <a:r>
+              <a:rPr lang="en-US" dirty="0" smtClean="0"/>
+              <a:t>$ </a:t>
+            </a:r>
+            <a:r>
+              <a:rPr lang="en-US" dirty="0" err="1" smtClean="0"/>
+              <a:t>mkdir</a:t>
+            </a:r>
+            <a:r>
+              <a:rPr lang="en-US" dirty="0" smtClean="0"/>
+              <a:t> –p $HOME/</a:t>
+            </a:r>
+            <a:r>
+              <a:rPr lang="en-US" dirty="0" err="1" smtClean="0"/>
+              <a:t>lcp</a:t>
+            </a:r>
+            <a:r>
+              <a:rPr lang="en-US" dirty="0" smtClean="0"/>
+              <a:t>/go-</a:t>
+            </a:r>
+            <a:r>
+              <a:rPr lang="en-US" dirty="0" err="1" smtClean="0"/>
+              <a:t>lang</a:t>
+            </a:r>
+            <a:r>
+              <a:rPr lang="en-US" dirty="0" smtClean="0"/>
+              <a:t>-programming</a:t>
+            </a:r>
+          </a:p>
+          <a:p>
+            <a:pPr marL="914400" lvl="1" indent="-514350">
+              <a:buFont typeface="+mj-lt"/>
+              <a:buAutoNum type="arabicPeriod"/>
+            </a:pPr>
+            <a:r>
+              <a:rPr lang="en-US" dirty="0" smtClean="0"/>
+              <a:t>Set GOPATH </a:t>
+            </a:r>
+            <a:r>
+              <a:rPr lang="en-US" dirty="0" err="1" smtClean="0"/>
+              <a:t>env</a:t>
+            </a:r>
+            <a:r>
+              <a:rPr lang="en-US" dirty="0" smtClean="0"/>
+              <a:t> to point this directory</a:t>
+            </a:r>
+          </a:p>
+          <a:p>
+            <a:pPr marL="514350" indent="-514350">
+              <a:buFont typeface="+mj-lt"/>
+              <a:buAutoNum type="arabicPeriod"/>
+            </a:pPr>
+            <a:r>
+              <a:rPr lang="en-US" dirty="0" smtClean="0"/>
+              <a:t>Install Visual Studio Code</a:t>
+            </a:r>
+          </a:p>
+          <a:p>
+            <a:pPr marL="914400" lvl="1" indent="-514350"/>
+            <a:r>
+              <a:rPr lang="en-US" dirty="0" smtClean="0"/>
+              <a:t>Install Go plugin</a:t>
+            </a:r>
+          </a:p>
+        </p:txBody>
+      </p:sp>
+    </p:spTree>
+    <p:extLst>
+      <p:ext uri="{BB962C8B-B14F-4D97-AF65-F5344CB8AC3E}">
+        <p14:creationId xmlns:p14="http://schemas.microsoft.com/office/powerpoint/2010/main" val="1842219598"/>
+      </p:ext>
+    </p:extLst>
+  </p:cSld>
+  <p:clrMapOvr>
+    <a:masterClrMapping/>
+  </p:clrMapOvr>
+  <p:timing>
+    <p:tnLst>
+      <p:par>
+        <p:cTn xmlns:p14="http://schemas.microsoft.com/office/powerpoint/2010/main" id="1" dur="indefinite" restart="never" nodeType="tmRoot"/>
+      </p:par>
+    </p:tnLst>
+  </p:timing>
+</p:sld>
+</file>
+
+<file path=ppt/slides/slide11.xml><?xml version="1.0" encoding="utf-8"?>
+<p:sld xmlns:a="http://schemas.openxmlformats.org/drawingml/2006/main" xmlns:r="http://schemas.openxmlformats.org/officeDocument/2006/relationships" xmlns:p="http://schemas.openxmlformats.org/presentationml/2006/main">
+  <p:cSld>
+    <p:spTree>
+      <p:nvGrpSpPr>
+        <p:cNvPr id="1" name=""/>
+        <p:cNvGrpSpPr/>
+        <p:nvPr/>
+      </p:nvGrpSpPr>
+      <p:grpSpPr>
+        <a:xfrm>
+          <a:off x="0" y="0"/>
+          <a:ext cx="0" cy="0"/>
+          <a:chOff x="0" y="0"/>
+          <a:chExt cx="0" cy="0"/>
+        </a:xfrm>
+      </p:grpSpPr>
+      <p:sp>
+        <p:nvSpPr>
+          <p:cNvPr id="2" name="Title 1"/>
+          <p:cNvSpPr>
+            <a:spLocks noGrp="1"/>
+          </p:cNvSpPr>
+          <p:nvPr>
+            <p:ph type="ctrTitle"/>
+          </p:nvPr>
+        </p:nvSpPr>
+        <p:spPr/>
+        <p:txBody>
+          <a:bodyPr/>
+          <a:lstStyle/>
+          <a:p>
+            <a:r>
+              <a:rPr lang="en-US" dirty="0" smtClean="0"/>
+              <a:t>Chapter </a:t>
+            </a:r>
+            <a:r>
+              <a:rPr lang="en-US" dirty="0" smtClean="0"/>
+              <a:t>2 </a:t>
+            </a:r>
+            <a:r>
+              <a:rPr lang="en-US" dirty="0" smtClean="0"/>
+              <a:t>– </a:t>
+            </a:r>
+            <a:r>
+              <a:rPr lang="en-US" dirty="0" smtClean="0"/>
+              <a:t>The Basics</a:t>
+            </a:r>
+            <a:endParaRPr lang="en-US" dirty="0"/>
+          </a:p>
+        </p:txBody>
+      </p:sp>
+      <p:sp>
+        <p:nvSpPr>
+          <p:cNvPr id="3" name="Subtitle 2"/>
+          <p:cNvSpPr>
+            <a:spLocks noGrp="1"/>
+          </p:cNvSpPr>
+          <p:nvPr>
+            <p:ph type="subTitle" idx="1"/>
+          </p:nvPr>
+        </p:nvSpPr>
+        <p:spPr/>
+        <p:txBody>
+          <a:bodyPr/>
+          <a:lstStyle/>
+          <a:p>
+            <a:r>
+              <a:rPr lang="en-US" dirty="0" smtClean="0"/>
+              <a:t>Section </a:t>
+            </a:r>
+            <a:r>
+              <a:rPr lang="en-US" dirty="0" smtClean="0"/>
+              <a:t>1</a:t>
+            </a:r>
+            <a:endParaRPr lang="en-US" dirty="0" smtClean="0"/>
+          </a:p>
+          <a:p>
+            <a:r>
+              <a:rPr lang="en-US" dirty="0" smtClean="0"/>
+              <a:t>Getting To Know Go (</a:t>
+            </a:r>
+            <a:r>
+              <a:rPr lang="en-US" dirty="0" err="1" smtClean="0"/>
+              <a:t>golang</a:t>
+            </a:r>
+            <a:r>
+              <a:rPr lang="en-US" dirty="0" smtClean="0"/>
+              <a:t>)</a:t>
+            </a:r>
+            <a:endParaRPr lang="en-US" dirty="0"/>
+          </a:p>
+        </p:txBody>
+      </p:sp>
+    </p:spTree>
+    <p:extLst>
+      <p:ext uri="{BB962C8B-B14F-4D97-AF65-F5344CB8AC3E}">
+        <p14:creationId xmlns:p14="http://schemas.microsoft.com/office/powerpoint/2010/main" val="937193742"/>
+      </p:ext>
+    </p:extLst>
+  </p:cSld>
+  <p:clrMapOvr>
+    <a:masterClrMapping/>
+  </p:clrMapOvr>
+  <p:timing>
+    <p:tnLst>
+      <p:par>
+        <p:cTn xmlns:p14="http://schemas.microsoft.com/office/powerpoint/2010/main" id="1" dur="indefinite" restart="never" nodeType="tmRoot"/>
+      </p:par>
+    </p:tnLst>
+  </p:timing>
+</p:sld>
+</file>
+
+<file path=ppt/slides/slide12.xml><?xml version="1.0" encoding="utf-8"?>
+<p:sld xmlns:a="http://schemas.openxmlformats.org/drawingml/2006/main" xmlns:r="http://schemas.openxmlformats.org/officeDocument/2006/relationships" xmlns:p="http://schemas.openxmlformats.org/presentationml/2006/main">
+  <p:cSld>
+    <p:spTree>
+      <p:nvGrpSpPr>
+        <p:cNvPr id="1" name=""/>
+        <p:cNvGrpSpPr/>
+        <p:nvPr/>
+      </p:nvGrpSpPr>
+      <p:grpSpPr>
+        <a:xfrm>
+          <a:off x="0" y="0"/>
+          <a:ext cx="0" cy="0"/>
+          <a:chOff x="0" y="0"/>
+          <a:chExt cx="0" cy="0"/>
+        </a:xfrm>
+      </p:grpSpPr>
+      <p:sp>
+        <p:nvSpPr>
+          <p:cNvPr id="2" name="Title 1"/>
+          <p:cNvSpPr>
+            <a:spLocks noGrp="1"/>
+          </p:cNvSpPr>
+          <p:nvPr>
+            <p:ph type="title"/>
+          </p:nvPr>
+        </p:nvSpPr>
+        <p:spPr/>
+        <p:txBody>
+          <a:bodyPr/>
+          <a:lstStyle/>
+          <a:p>
+            <a:r>
+              <a:rPr lang="en-US" dirty="0" smtClean="0"/>
+              <a:t>Objectives</a:t>
+            </a:r>
+            <a:endParaRPr lang="en-US" dirty="0"/>
+          </a:p>
+        </p:txBody>
+      </p:sp>
+      <p:sp>
+        <p:nvSpPr>
+          <p:cNvPr id="3" name="Content Placeholder 2"/>
+          <p:cNvSpPr>
+            <a:spLocks noGrp="1"/>
+          </p:cNvSpPr>
+          <p:nvPr>
+            <p:ph idx="1"/>
+          </p:nvPr>
+        </p:nvSpPr>
+        <p:spPr/>
+        <p:txBody>
+          <a:bodyPr/>
+          <a:lstStyle/>
+          <a:p>
+            <a:r>
+              <a:rPr lang="en-US" dirty="0" smtClean="0"/>
+              <a:t>What is Go?</a:t>
+            </a:r>
+          </a:p>
+          <a:p>
+            <a:r>
+              <a:rPr lang="en-US" dirty="0" smtClean="0"/>
+              <a:t>Why Learn Go?</a:t>
+            </a:r>
+          </a:p>
+          <a:p>
+            <a:endParaRPr lang="en-US" dirty="0"/>
+          </a:p>
+        </p:txBody>
+      </p:sp>
+    </p:spTree>
+    <p:extLst>
+      <p:ext uri="{BB962C8B-B14F-4D97-AF65-F5344CB8AC3E}">
+        <p14:creationId xmlns:p14="http://schemas.microsoft.com/office/powerpoint/2010/main" val="2966743705"/>
+      </p:ext>
+    </p:extLst>
+  </p:cSld>
+  <p:clrMapOvr>
+    <a:masterClrMapping/>
+  </p:clrMapOvr>
+</p:sld>
+</file>
+
+<file path=ppt/slides/slide13.xml><?xml version="1.0" encoding="utf-8"?>
+<p:sld xmlns:a="http://schemas.openxmlformats.org/drawingml/2006/main" xmlns:r="http://schemas.openxmlformats.org/officeDocument/2006/relationships" xmlns:p="http://schemas.openxmlformats.org/presentationml/2006/main">
+  <p:cSld>
+    <p:spTree>
+      <p:nvGrpSpPr>
+        <p:cNvPr id="1" name=""/>
+        <p:cNvGrpSpPr/>
+        <p:nvPr/>
+      </p:nvGrpSpPr>
+      <p:grpSpPr>
+        <a:xfrm>
+          <a:off x="0" y="0"/>
+          <a:ext cx="0" cy="0"/>
+          <a:chOff x="0" y="0"/>
+          <a:chExt cx="0" cy="0"/>
+        </a:xfrm>
+      </p:grpSpPr>
+      <p:sp>
+        <p:nvSpPr>
+          <p:cNvPr id="2" name="Title 1"/>
+          <p:cNvSpPr>
+            <a:spLocks noGrp="1"/>
+          </p:cNvSpPr>
+          <p:nvPr>
+            <p:ph type="title"/>
+          </p:nvPr>
+        </p:nvSpPr>
+        <p:spPr/>
+        <p:txBody>
+          <a:bodyPr/>
+          <a:lstStyle/>
+          <a:p>
+            <a:r>
+              <a:rPr lang="en-US" dirty="0" smtClean="0"/>
+              <a:t>Go (</a:t>
+            </a:r>
+            <a:r>
+              <a:rPr lang="en-US" dirty="0" err="1" smtClean="0"/>
+              <a:t>golang</a:t>
+            </a:r>
+            <a:r>
+              <a:rPr lang="en-US" dirty="0" smtClean="0"/>
+              <a:t>) Mascot</a:t>
+            </a:r>
+            <a:endParaRPr lang="en-US" dirty="0"/>
+          </a:p>
+        </p:txBody>
+      </p:sp>
+      <p:pic>
+        <p:nvPicPr>
+          <p:cNvPr id="4" name="Content Placeholder 3"/>
+          <p:cNvPicPr>
+            <a:picLocks noGrp="1" noChangeAspect="1"/>
+          </p:cNvPicPr>
+          <p:nvPr>
+            <p:ph idx="1"/>
+          </p:nvPr>
+        </p:nvPicPr>
+        <p:blipFill>
+          <a:blip r:embed="rId2"/>
+          <a:srcRect l="-40915" r="-40915"/>
+          <a:stretch>
+            <a:fillRect/>
+          </a:stretch>
+        </p:blipFill>
+        <p:spPr/>
+      </p:pic>
+    </p:spTree>
+    <p:extLst>
+      <p:ext uri="{BB962C8B-B14F-4D97-AF65-F5344CB8AC3E}">
+        <p14:creationId xmlns:p14="http://schemas.microsoft.com/office/powerpoint/2010/main" val="3832679021"/>
+      </p:ext>
+    </p:extLst>
+  </p:cSld>
+  <p:clrMapOvr>
+    <a:masterClrMapping/>
+  </p:clrMapOvr>
+</p:sld>
+</file>
+
+<file path=ppt/slides/slide14.xml><?xml version="1.0" encoding="utf-8"?>
+<p:sld xmlns:a="http://schemas.openxmlformats.org/drawingml/2006/main" xmlns:r="http://schemas.openxmlformats.org/officeDocument/2006/relationships" xmlns:p="http://schemas.openxmlformats.org/presentationml/2006/main">
+  <p:cSld>
+    <p:spTree>
+      <p:nvGrpSpPr>
+        <p:cNvPr id="1" name=""/>
+        <p:cNvGrpSpPr/>
+        <p:nvPr/>
+      </p:nvGrpSpPr>
+      <p:grpSpPr>
+        <a:xfrm>
+          <a:off x="0" y="0"/>
+          <a:ext cx="0" cy="0"/>
+          <a:chOff x="0" y="0"/>
+          <a:chExt cx="0" cy="0"/>
+        </a:xfrm>
+      </p:grpSpPr>
+      <p:sp>
+        <p:nvSpPr>
+          <p:cNvPr id="2" name="Title 1"/>
+          <p:cNvSpPr>
+            <a:spLocks noGrp="1"/>
+          </p:cNvSpPr>
+          <p:nvPr>
+            <p:ph type="title"/>
+          </p:nvPr>
+        </p:nvSpPr>
+        <p:spPr/>
+        <p:txBody>
+          <a:bodyPr/>
+          <a:lstStyle/>
+          <a:p>
+            <a:r>
+              <a:rPr lang="en-US" dirty="0" smtClean="0"/>
+              <a:t>What is Go?</a:t>
+            </a:r>
+            <a:endParaRPr lang="en-US" dirty="0"/>
+          </a:p>
+        </p:txBody>
+      </p:sp>
+      <p:sp>
+        <p:nvSpPr>
+          <p:cNvPr id="3" name="Content Placeholder 2"/>
+          <p:cNvSpPr>
+            <a:spLocks noGrp="1"/>
+          </p:cNvSpPr>
+          <p:nvPr>
+            <p:ph idx="1"/>
+          </p:nvPr>
+        </p:nvSpPr>
+        <p:spPr/>
+        <p:txBody>
+          <a:bodyPr>
+            <a:normAutofit fontScale="70000" lnSpcReduction="20000"/>
+          </a:bodyPr>
+          <a:lstStyle/>
+          <a:p>
+            <a:r>
+              <a:rPr lang="en-US" dirty="0" smtClean="0"/>
+              <a:t>From </a:t>
+            </a:r>
+            <a:r>
+              <a:rPr lang="en-US" dirty="0" smtClean="0">
+                <a:hlinkClick r:id="rId2"/>
+              </a:rPr>
+              <a:t>http://golang.org</a:t>
+            </a:r>
+            <a:r>
+              <a:rPr lang="en-US" dirty="0" smtClean="0"/>
+              <a:t>:</a:t>
+            </a:r>
+          </a:p>
+          <a:p>
+            <a:pPr lvl="1"/>
+            <a:r>
+              <a:rPr lang="en-US" dirty="0"/>
+              <a:t>Go is an open source programming language that makes it easy to build </a:t>
+            </a:r>
+            <a:r>
+              <a:rPr lang="en-US" b="1" i="1" dirty="0">
+                <a:solidFill>
+                  <a:srgbClr val="008000"/>
+                </a:solidFill>
+              </a:rPr>
+              <a:t>simple</a:t>
+            </a:r>
+            <a:r>
+              <a:rPr lang="en-US" dirty="0"/>
+              <a:t>, </a:t>
+            </a:r>
+            <a:r>
+              <a:rPr lang="en-US" b="1" i="1" dirty="0">
+                <a:solidFill>
+                  <a:srgbClr val="008000"/>
+                </a:solidFill>
+              </a:rPr>
+              <a:t>reliable</a:t>
+            </a:r>
+            <a:r>
+              <a:rPr lang="en-US" dirty="0"/>
+              <a:t>, and </a:t>
+            </a:r>
+            <a:r>
+              <a:rPr lang="en-US" b="1" i="1" dirty="0">
+                <a:solidFill>
+                  <a:srgbClr val="008000"/>
+                </a:solidFill>
+              </a:rPr>
+              <a:t>efficient</a:t>
+            </a:r>
+            <a:r>
+              <a:rPr lang="en-US" dirty="0">
+                <a:solidFill>
+                  <a:srgbClr val="008000"/>
+                </a:solidFill>
+              </a:rPr>
+              <a:t> </a:t>
+            </a:r>
+            <a:r>
+              <a:rPr lang="en-US" dirty="0"/>
+              <a:t>software.</a:t>
+            </a:r>
+            <a:endParaRPr lang="en-US" dirty="0" smtClean="0"/>
+          </a:p>
+          <a:p>
+            <a:r>
+              <a:rPr lang="en-US" dirty="0" smtClean="0"/>
+              <a:t>From Wikipedia ():</a:t>
+            </a:r>
+          </a:p>
+          <a:p>
+            <a:pPr lvl="1"/>
+            <a:r>
+              <a:rPr lang="en-US" b="1" i="1" dirty="0"/>
+              <a:t>Go </a:t>
+            </a:r>
+            <a:r>
+              <a:rPr lang="en-US" dirty="0"/>
+              <a:t>(often referred to as </a:t>
+            </a:r>
+            <a:r>
+              <a:rPr lang="en-US" b="1" i="1" dirty="0" err="1"/>
+              <a:t>golang</a:t>
+            </a:r>
+            <a:r>
+              <a:rPr lang="en-US" dirty="0"/>
+              <a:t>) is an </a:t>
+            </a:r>
+            <a:r>
+              <a:rPr lang="en-US" i="1" dirty="0">
+                <a:solidFill>
+                  <a:srgbClr val="0000FF"/>
+                </a:solidFill>
+              </a:rPr>
+              <a:t>open </a:t>
+            </a:r>
+            <a:r>
+              <a:rPr lang="en-US" i="1" dirty="0" smtClean="0">
+                <a:solidFill>
+                  <a:srgbClr val="0000FF"/>
+                </a:solidFill>
+              </a:rPr>
+              <a:t>source </a:t>
+            </a:r>
+            <a:r>
+              <a:rPr lang="en-US" dirty="0" smtClean="0"/>
+              <a:t>programming </a:t>
+            </a:r>
+            <a:r>
+              <a:rPr lang="en-US" dirty="0"/>
+              <a:t>language created at </a:t>
+            </a:r>
+            <a:r>
+              <a:rPr lang="en-US" i="1" dirty="0" smtClean="0">
+                <a:solidFill>
+                  <a:srgbClr val="0000FF"/>
+                </a:solidFill>
+              </a:rPr>
+              <a:t>Google</a:t>
+            </a:r>
+            <a:r>
+              <a:rPr lang="en-US" dirty="0" smtClean="0">
+                <a:solidFill>
+                  <a:srgbClr val="0000FF"/>
+                </a:solidFill>
+              </a:rPr>
+              <a:t> </a:t>
+            </a:r>
+            <a:r>
+              <a:rPr lang="en-US" dirty="0" smtClean="0"/>
+              <a:t>in </a:t>
+            </a:r>
+            <a:r>
+              <a:rPr lang="en-US" i="1" dirty="0">
+                <a:solidFill>
+                  <a:srgbClr val="0000FF"/>
+                </a:solidFill>
+              </a:rPr>
+              <a:t>2007</a:t>
+            </a:r>
+            <a:r>
+              <a:rPr lang="en-US" dirty="0">
+                <a:solidFill>
+                  <a:srgbClr val="0000FF"/>
+                </a:solidFill>
+              </a:rPr>
+              <a:t> </a:t>
+            </a:r>
+            <a:r>
+              <a:rPr lang="en-US" dirty="0"/>
+              <a:t>by </a:t>
+            </a:r>
+            <a:r>
+              <a:rPr lang="en-US" i="1" dirty="0">
+                <a:solidFill>
+                  <a:srgbClr val="0000FF"/>
+                </a:solidFill>
+              </a:rPr>
+              <a:t>Robert </a:t>
+            </a:r>
+            <a:r>
+              <a:rPr lang="en-US" i="1" dirty="0" err="1">
+                <a:solidFill>
+                  <a:srgbClr val="0000FF"/>
+                </a:solidFill>
+              </a:rPr>
+              <a:t>Griesemer</a:t>
+            </a:r>
+            <a:r>
+              <a:rPr lang="en-US" dirty="0"/>
+              <a:t>, </a:t>
+            </a:r>
+            <a:r>
+              <a:rPr lang="en-US" i="1" dirty="0">
+                <a:solidFill>
+                  <a:srgbClr val="0000FF"/>
+                </a:solidFill>
+              </a:rPr>
+              <a:t>Rob Pike</a:t>
+            </a:r>
+            <a:r>
+              <a:rPr lang="en-US" dirty="0"/>
+              <a:t>, and </a:t>
+            </a:r>
+            <a:r>
+              <a:rPr lang="en-US" i="1" dirty="0">
+                <a:solidFill>
+                  <a:srgbClr val="0000FF"/>
+                </a:solidFill>
+              </a:rPr>
+              <a:t>Ken Thompson</a:t>
+            </a:r>
+            <a:r>
+              <a:rPr lang="en-US" dirty="0" smtClean="0"/>
+              <a:t>. It </a:t>
+            </a:r>
+            <a:r>
+              <a:rPr lang="en-US" dirty="0"/>
+              <a:t>is a </a:t>
+            </a:r>
+            <a:r>
+              <a:rPr lang="en-US" i="1" dirty="0">
+                <a:solidFill>
+                  <a:srgbClr val="0000FF"/>
+                </a:solidFill>
+              </a:rPr>
+              <a:t>compiled</a:t>
+            </a:r>
+            <a:r>
+              <a:rPr lang="en-US" dirty="0" smtClean="0"/>
+              <a:t>, </a:t>
+            </a:r>
+            <a:r>
+              <a:rPr lang="en-US" i="1" dirty="0" smtClean="0">
+                <a:solidFill>
+                  <a:srgbClr val="0000FF"/>
+                </a:solidFill>
+              </a:rPr>
+              <a:t>statically</a:t>
+            </a:r>
+            <a:r>
+              <a:rPr lang="en-US" dirty="0" smtClean="0">
+                <a:solidFill>
+                  <a:srgbClr val="0000FF"/>
+                </a:solidFill>
+              </a:rPr>
+              <a:t> </a:t>
+            </a:r>
+            <a:r>
+              <a:rPr lang="en-US" i="1" dirty="0">
+                <a:solidFill>
+                  <a:srgbClr val="0000FF"/>
+                </a:solidFill>
+              </a:rPr>
+              <a:t>typed</a:t>
+            </a:r>
+            <a:r>
+              <a:rPr lang="en-US" dirty="0">
+                <a:solidFill>
+                  <a:srgbClr val="0000FF"/>
+                </a:solidFill>
+              </a:rPr>
+              <a:t> </a:t>
+            </a:r>
+            <a:r>
+              <a:rPr lang="en-US" dirty="0"/>
+              <a:t>language in the tradition of </a:t>
+            </a:r>
+            <a:r>
+              <a:rPr lang="en-US" i="1" dirty="0" err="1">
+                <a:solidFill>
+                  <a:srgbClr val="FF0000"/>
+                </a:solidFill>
+              </a:rPr>
+              <a:t>Algol</a:t>
+            </a:r>
+            <a:r>
+              <a:rPr lang="en-US" dirty="0">
+                <a:solidFill>
+                  <a:srgbClr val="FF0000"/>
+                </a:solidFill>
+              </a:rPr>
+              <a:t> </a:t>
+            </a:r>
+            <a:r>
+              <a:rPr lang="en-US" dirty="0"/>
+              <a:t>and </a:t>
+            </a:r>
+            <a:r>
+              <a:rPr lang="en-US" i="1" dirty="0">
+                <a:solidFill>
+                  <a:srgbClr val="FF0000"/>
+                </a:solidFill>
+              </a:rPr>
+              <a:t>C</a:t>
+            </a:r>
+            <a:r>
+              <a:rPr lang="en-US" dirty="0"/>
+              <a:t>, with </a:t>
+            </a:r>
+            <a:r>
+              <a:rPr lang="en-US" i="1" dirty="0">
+                <a:solidFill>
+                  <a:srgbClr val="0000FF"/>
+                </a:solidFill>
+              </a:rPr>
+              <a:t>garbage collection</a:t>
+            </a:r>
+            <a:r>
+              <a:rPr lang="en-US" dirty="0"/>
+              <a:t>, </a:t>
+            </a:r>
+            <a:r>
+              <a:rPr lang="en-US" i="1" dirty="0"/>
+              <a:t>limited structural typing</a:t>
+            </a:r>
+            <a:r>
+              <a:rPr lang="en-US" dirty="0" smtClean="0"/>
+              <a:t>, </a:t>
+            </a:r>
+            <a:r>
+              <a:rPr lang="en-US" i="1" dirty="0" smtClean="0"/>
+              <a:t>memory </a:t>
+            </a:r>
+            <a:r>
+              <a:rPr lang="en-US" i="1" dirty="0"/>
+              <a:t>safety </a:t>
+            </a:r>
+            <a:r>
+              <a:rPr lang="en-US" dirty="0"/>
+              <a:t>features and </a:t>
+            </a:r>
+            <a:r>
+              <a:rPr lang="en-US" b="1" i="1" dirty="0">
+                <a:solidFill>
+                  <a:srgbClr val="0000FF"/>
+                </a:solidFill>
+              </a:rPr>
+              <a:t>CSP</a:t>
+            </a:r>
+            <a:r>
+              <a:rPr lang="en-US" dirty="0"/>
+              <a:t>-style concurrent programming features added</a:t>
+            </a:r>
+            <a:r>
+              <a:rPr lang="en-US" dirty="0" smtClean="0"/>
+              <a:t>.</a:t>
+            </a:r>
+          </a:p>
+          <a:p>
+            <a:pPr lvl="1"/>
+            <a:r>
+              <a:rPr lang="en-US" dirty="0" smtClean="0"/>
+              <a:t>The </a:t>
+            </a:r>
+            <a:r>
+              <a:rPr lang="en-US" dirty="0"/>
+              <a:t>language was announced in </a:t>
+            </a:r>
+            <a:r>
+              <a:rPr lang="en-US" i="1" dirty="0">
+                <a:solidFill>
+                  <a:srgbClr val="0000FF"/>
+                </a:solidFill>
+              </a:rPr>
+              <a:t>November 2009</a:t>
+            </a:r>
+            <a:r>
+              <a:rPr lang="en-US" dirty="0"/>
+              <a:t>; </a:t>
+            </a:r>
+            <a:r>
+              <a:rPr lang="en-US" i="1" dirty="0">
+                <a:solidFill>
+                  <a:srgbClr val="008000"/>
+                </a:solidFill>
+              </a:rPr>
+              <a:t>it is used in some of Google's production systems</a:t>
+            </a:r>
+            <a:r>
+              <a:rPr lang="en-US" dirty="0" smtClean="0"/>
+              <a:t>, as </a:t>
+            </a:r>
+            <a:r>
+              <a:rPr lang="en-US" dirty="0"/>
+              <a:t>well as by other firms. Two major implementations exist: Google's Go compiler, "</a:t>
+            </a:r>
+            <a:r>
+              <a:rPr lang="en-US" dirty="0" err="1"/>
+              <a:t>gc</a:t>
+            </a:r>
+            <a:r>
+              <a:rPr lang="en-US" dirty="0"/>
+              <a:t>", is developed as open source software and targets various platforms including </a:t>
+            </a:r>
+            <a:r>
+              <a:rPr lang="en-US" i="1" dirty="0">
+                <a:solidFill>
+                  <a:srgbClr val="FF0000"/>
+                </a:solidFill>
+              </a:rPr>
+              <a:t>Linux, OS X, Windows, various BSD </a:t>
+            </a:r>
+            <a:r>
+              <a:rPr lang="en-US" dirty="0"/>
+              <a:t>and</a:t>
+            </a:r>
+            <a:r>
+              <a:rPr lang="en-US" i="1" dirty="0"/>
+              <a:t> </a:t>
+            </a:r>
+            <a:r>
+              <a:rPr lang="en-US" i="1" dirty="0">
+                <a:solidFill>
+                  <a:srgbClr val="FF0000"/>
+                </a:solidFill>
+              </a:rPr>
+              <a:t>Unix versions</a:t>
+            </a:r>
+            <a:r>
+              <a:rPr lang="en-US" dirty="0"/>
+              <a:t>, and since 2015 also mobile devices, including smartphones.</a:t>
+            </a:r>
+            <a:endParaRPr lang="en-US" dirty="0" smtClean="0"/>
+          </a:p>
+        </p:txBody>
+      </p:sp>
+    </p:spTree>
+    <p:extLst>
+      <p:ext uri="{BB962C8B-B14F-4D97-AF65-F5344CB8AC3E}">
+        <p14:creationId xmlns:p14="http://schemas.microsoft.com/office/powerpoint/2010/main" val="940422625"/>
+      </p:ext>
+    </p:extLst>
+  </p:cSld>
+  <p:clrMapOvr>
+    <a:masterClrMapping/>
+  </p:clrMapOvr>
+</p:sld>
+</file>
+
+<file path=ppt/slides/slide15.xml><?xml version="1.0" encoding="utf-8"?>
+<p:sld xmlns:a="http://schemas.openxmlformats.org/drawingml/2006/main" xmlns:r="http://schemas.openxmlformats.org/officeDocument/2006/relationships" xmlns:p="http://schemas.openxmlformats.org/presentationml/2006/main">
+  <p:cSld>
+    <p:spTree>
+      <p:nvGrpSpPr>
+        <p:cNvPr id="1" name=""/>
+        <p:cNvGrpSpPr/>
+        <p:nvPr/>
+      </p:nvGrpSpPr>
+      <p:grpSpPr>
+        <a:xfrm>
+          <a:off x="0" y="0"/>
+          <a:ext cx="0" cy="0"/>
+          <a:chOff x="0" y="0"/>
+          <a:chExt cx="0" cy="0"/>
+        </a:xfrm>
+      </p:grpSpPr>
+      <p:sp>
+        <p:nvSpPr>
+          <p:cNvPr id="2" name="Title 1"/>
+          <p:cNvSpPr>
+            <a:spLocks noGrp="1"/>
+          </p:cNvSpPr>
+          <p:nvPr>
+            <p:ph type="title"/>
+          </p:nvPr>
+        </p:nvSpPr>
+        <p:spPr/>
+        <p:txBody>
+          <a:bodyPr/>
+          <a:lstStyle/>
+          <a:p>
+            <a:r>
+              <a:rPr lang="en-US" dirty="0" smtClean="0"/>
+              <a:t>Go and C Compared</a:t>
+            </a:r>
+            <a:endParaRPr lang="en-US" dirty="0"/>
+          </a:p>
+        </p:txBody>
+      </p:sp>
+      <p:pic>
+        <p:nvPicPr>
+          <p:cNvPr id="5" name="Content Placeholder 4"/>
+          <p:cNvPicPr>
+            <a:picLocks noGrp="1" noChangeAspect="1"/>
+          </p:cNvPicPr>
+          <p:nvPr>
+            <p:ph idx="1"/>
+          </p:nvPr>
+        </p:nvPicPr>
+        <p:blipFill>
+          <a:blip r:embed="rId2"/>
+          <a:srcRect t="-21135" b="-21135"/>
+          <a:stretch>
+            <a:fillRect/>
+          </a:stretch>
+        </p:blipFill>
+        <p:spPr/>
+      </p:pic>
+    </p:spTree>
+    <p:extLst>
+      <p:ext uri="{BB962C8B-B14F-4D97-AF65-F5344CB8AC3E}">
+        <p14:creationId xmlns:p14="http://schemas.microsoft.com/office/powerpoint/2010/main" val="38714772"/>
+      </p:ext>
+    </p:extLst>
+  </p:cSld>
+  <p:clrMapOvr>
+    <a:masterClrMapping/>
+  </p:clrMapOvr>
+</p:sld>
+</file>
+
+<file path=ppt/slides/slide16.xml><?xml version="1.0" encoding="utf-8"?>
+<p:sld xmlns:a="http://schemas.openxmlformats.org/drawingml/2006/main" xmlns:r="http://schemas.openxmlformats.org/officeDocument/2006/relationships" xmlns:p="http://schemas.openxmlformats.org/presentationml/2006/main">
+  <p:cSld>
+    <p:spTree>
+      <p:nvGrpSpPr>
+        <p:cNvPr id="1" name=""/>
+        <p:cNvGrpSpPr/>
+        <p:nvPr/>
+      </p:nvGrpSpPr>
+      <p:grpSpPr>
+        <a:xfrm>
+          <a:off x="0" y="0"/>
+          <a:ext cx="0" cy="0"/>
+          <a:chOff x="0" y="0"/>
+          <a:chExt cx="0" cy="0"/>
+        </a:xfrm>
+      </p:grpSpPr>
+      <p:sp>
+        <p:nvSpPr>
+          <p:cNvPr id="2" name="Title 1"/>
+          <p:cNvSpPr>
+            <a:spLocks noGrp="1"/>
+          </p:cNvSpPr>
+          <p:nvPr>
+            <p:ph type="title"/>
+          </p:nvPr>
+        </p:nvSpPr>
+        <p:spPr/>
+        <p:txBody>
+          <a:bodyPr>
+            <a:normAutofit fontScale="90000"/>
+          </a:bodyPr>
+          <a:lstStyle/>
+          <a:p>
+            <a:r>
+              <a:rPr lang="en-US" dirty="0" smtClean="0"/>
+              <a:t>CSP:</a:t>
+            </a:r>
+            <a:br>
+              <a:rPr lang="en-US" dirty="0" smtClean="0"/>
+            </a:br>
+            <a:r>
+              <a:rPr lang="en-US" sz="3600" dirty="0" smtClean="0"/>
+              <a:t>(Communicating Sequential Processes)</a:t>
+            </a:r>
+            <a:endParaRPr lang="en-US" sz="3600" dirty="0"/>
+          </a:p>
+        </p:txBody>
+      </p:sp>
+      <p:pic>
+        <p:nvPicPr>
+          <p:cNvPr id="4" name="Content Placeholder 3"/>
+          <p:cNvPicPr>
+            <a:picLocks noGrp="1" noChangeAspect="1"/>
+          </p:cNvPicPr>
+          <p:nvPr>
+            <p:ph idx="1"/>
+          </p:nvPr>
+        </p:nvPicPr>
+        <p:blipFill>
+          <a:blip r:embed="rId2"/>
+          <a:srcRect t="-14449" b="-14449"/>
+          <a:stretch>
+            <a:fillRect/>
+          </a:stretch>
+        </p:blipFill>
+        <p:spPr/>
+      </p:pic>
+    </p:spTree>
+    <p:extLst>
+      <p:ext uri="{BB962C8B-B14F-4D97-AF65-F5344CB8AC3E}">
+        <p14:creationId xmlns:p14="http://schemas.microsoft.com/office/powerpoint/2010/main" val="3892636291"/>
+      </p:ext>
+    </p:extLst>
+  </p:cSld>
+  <p:clrMapOvr>
+    <a:masterClrMapping/>
+  </p:clrMapOvr>
+</p:sld>
+</file>
+
+<file path=ppt/slides/slide17.xml><?xml version="1.0" encoding="utf-8"?>
+<p:sld xmlns:a="http://schemas.openxmlformats.org/drawingml/2006/main" xmlns:r="http://schemas.openxmlformats.org/officeDocument/2006/relationships" xmlns:p="http://schemas.openxmlformats.org/presentationml/2006/main">
+  <p:cSld>
+    <p:spTree>
+      <p:nvGrpSpPr>
+        <p:cNvPr id="1" name=""/>
+        <p:cNvGrpSpPr/>
+        <p:nvPr/>
+      </p:nvGrpSpPr>
+      <p:grpSpPr>
+        <a:xfrm>
+          <a:off x="0" y="0"/>
+          <a:ext cx="0" cy="0"/>
+          <a:chOff x="0" y="0"/>
+          <a:chExt cx="0" cy="0"/>
+        </a:xfrm>
+      </p:grpSpPr>
+      <p:sp>
+        <p:nvSpPr>
+          <p:cNvPr id="2" name="Title 1"/>
+          <p:cNvSpPr>
+            <a:spLocks noGrp="1"/>
+          </p:cNvSpPr>
+          <p:nvPr>
+            <p:ph type="title"/>
+          </p:nvPr>
+        </p:nvSpPr>
+        <p:spPr/>
+        <p:txBody>
+          <a:bodyPr/>
+          <a:lstStyle/>
+          <a:p>
+            <a:r>
+              <a:rPr lang="en-US" dirty="0" smtClean="0"/>
+              <a:t>Why Learn Go?</a:t>
+            </a:r>
+            <a:endParaRPr lang="en-US" dirty="0"/>
+          </a:p>
+        </p:txBody>
+      </p:sp>
+      <p:sp>
+        <p:nvSpPr>
+          <p:cNvPr id="3" name="Content Placeholder 2"/>
+          <p:cNvSpPr>
+            <a:spLocks noGrp="1"/>
+          </p:cNvSpPr>
+          <p:nvPr>
+            <p:ph idx="1"/>
+          </p:nvPr>
+        </p:nvSpPr>
+        <p:spPr/>
+        <p:txBody>
+          <a:bodyPr>
+            <a:normAutofit lnSpcReduction="10000"/>
+          </a:bodyPr>
+          <a:lstStyle/>
+          <a:p>
+            <a:r>
+              <a:rPr lang="en-US" dirty="0" smtClean="0"/>
+              <a:t>Great talking point at your next geek party</a:t>
+            </a:r>
+          </a:p>
+          <a:p>
+            <a:r>
+              <a:rPr lang="en-US" dirty="0" smtClean="0"/>
+              <a:t>One of the new coolest things to do</a:t>
+            </a:r>
+          </a:p>
+          <a:p>
+            <a:r>
+              <a:rPr lang="en-US" i="1" dirty="0" smtClean="0"/>
+              <a:t>Job security</a:t>
+            </a:r>
+          </a:p>
+          <a:p>
+            <a:pPr lvl="1"/>
+            <a:r>
+              <a:rPr lang="en-US" dirty="0" smtClean="0"/>
+              <a:t>In existing job</a:t>
+            </a:r>
+          </a:p>
+          <a:p>
+            <a:pPr lvl="1"/>
+            <a:r>
+              <a:rPr lang="en-US" dirty="0" smtClean="0"/>
+              <a:t>In looking for new opportunities</a:t>
+            </a:r>
+          </a:p>
+          <a:p>
+            <a:r>
+              <a:rPr lang="en-US" i="1" dirty="0" smtClean="0"/>
+              <a:t>Fun</a:t>
+            </a:r>
+          </a:p>
+          <a:p>
+            <a:r>
+              <a:rPr lang="en-US" i="1" dirty="0" smtClean="0"/>
+              <a:t>A different way of thinking about software</a:t>
+            </a:r>
+          </a:p>
+          <a:p>
+            <a:r>
+              <a:rPr lang="en-US" i="1" dirty="0" smtClean="0"/>
+              <a:t>Makes a lot of hard stuff, easier</a:t>
+            </a:r>
+            <a:endParaRPr lang="en-US" i="1" dirty="0"/>
+          </a:p>
+        </p:txBody>
+      </p:sp>
+    </p:spTree>
+    <p:extLst>
+      <p:ext uri="{BB962C8B-B14F-4D97-AF65-F5344CB8AC3E}">
+        <p14:creationId xmlns:p14="http://schemas.microsoft.com/office/powerpoint/2010/main" val="1142255214"/>
+      </p:ext>
+    </p:extLst>
+  </p:cSld>
+  <p:clrMapOvr>
+    <a:masterClrMapping/>
+  </p:clrMapOvr>
+</p:sld>
+</file>
+
+<file path=ppt/slides/slide18.xml><?xml version="1.0" encoding="utf-8"?>
+<p:sld xmlns:a="http://schemas.openxmlformats.org/drawingml/2006/main" xmlns:r="http://schemas.openxmlformats.org/officeDocument/2006/relationships" xmlns:p="http://schemas.openxmlformats.org/presentationml/2006/main">
+  <p:cSld>
+    <p:spTree>
+      <p:nvGrpSpPr>
+        <p:cNvPr id="1" name=""/>
+        <p:cNvGrpSpPr/>
+        <p:nvPr/>
+      </p:nvGrpSpPr>
+      <p:grpSpPr>
+        <a:xfrm>
+          <a:off x="0" y="0"/>
+          <a:ext cx="0" cy="0"/>
+          <a:chOff x="0" y="0"/>
+          <a:chExt cx="0" cy="0"/>
+        </a:xfrm>
+      </p:grpSpPr>
+      <p:sp>
+        <p:nvSpPr>
+          <p:cNvPr id="2" name="Title 1"/>
+          <p:cNvSpPr>
+            <a:spLocks noGrp="1"/>
+          </p:cNvSpPr>
+          <p:nvPr>
+            <p:ph type="ctrTitle"/>
+          </p:nvPr>
+        </p:nvSpPr>
+        <p:spPr/>
+        <p:txBody>
+          <a:bodyPr/>
+          <a:lstStyle/>
+          <a:p>
+            <a:r>
+              <a:rPr lang="en-US" dirty="0" smtClean="0"/>
+              <a:t>Chapter </a:t>
+            </a:r>
+            <a:r>
+              <a:rPr lang="en-US" dirty="0" smtClean="0"/>
+              <a:t>2 </a:t>
+            </a:r>
+            <a:r>
+              <a:rPr lang="en-US" dirty="0" smtClean="0"/>
+              <a:t>– </a:t>
+            </a:r>
+            <a:r>
+              <a:rPr lang="en-US" dirty="0" smtClean="0"/>
+              <a:t>The Basics</a:t>
+            </a:r>
+            <a:endParaRPr lang="en-US" dirty="0"/>
+          </a:p>
+        </p:txBody>
+      </p:sp>
+      <p:sp>
+        <p:nvSpPr>
+          <p:cNvPr id="3" name="Subtitle 2"/>
+          <p:cNvSpPr>
+            <a:spLocks noGrp="1"/>
+          </p:cNvSpPr>
+          <p:nvPr>
+            <p:ph type="subTitle" idx="1"/>
+          </p:nvPr>
+        </p:nvSpPr>
+        <p:spPr/>
+        <p:txBody>
+          <a:bodyPr/>
+          <a:lstStyle/>
+          <a:p>
+            <a:r>
+              <a:rPr lang="en-US" dirty="0" smtClean="0"/>
+              <a:t>Section </a:t>
+            </a:r>
+            <a:r>
+              <a:rPr lang="en-US" dirty="0" smtClean="0"/>
+              <a:t>2</a:t>
+            </a:r>
+            <a:endParaRPr lang="en-US" dirty="0" smtClean="0"/>
+          </a:p>
+          <a:p>
+            <a:r>
+              <a:rPr lang="en-US" dirty="0" smtClean="0"/>
+              <a:t>Writing, Compiling, and Running Go Code</a:t>
+            </a:r>
+            <a:endParaRPr lang="en-US" dirty="0"/>
+          </a:p>
+        </p:txBody>
+      </p:sp>
+    </p:spTree>
+    <p:extLst>
+      <p:ext uri="{BB962C8B-B14F-4D97-AF65-F5344CB8AC3E}">
+        <p14:creationId xmlns:p14="http://schemas.microsoft.com/office/powerpoint/2010/main" val="392867197"/>
+      </p:ext>
+    </p:extLst>
+  </p:cSld>
+  <p:clrMapOvr>
+    <a:masterClrMapping/>
+  </p:clrMapOvr>
+  <p:timing>
+    <p:tnLst>
+      <p:par>
+        <p:cTn xmlns:p14="http://schemas.microsoft.com/office/powerpoint/2010/main" id="1" dur="indefinite" restart="never" nodeType="tmRoot"/>
+      </p:par>
+    </p:tnLst>
+  </p:timing>
+</p:sld>
+</file>
+
+<file path=ppt/slides/slide19.xml><?xml version="1.0" encoding="utf-8"?>
+<p:sld xmlns:a="http://schemas.openxmlformats.org/drawingml/2006/main" xmlns:r="http://schemas.openxmlformats.org/officeDocument/2006/relationships" xmlns:p="http://schemas.openxmlformats.org/presentationml/2006/main">
+  <p:cSld>
+    <p:spTree>
+      <p:nvGrpSpPr>
+        <p:cNvPr id="1" name=""/>
+        <p:cNvGrpSpPr/>
+        <p:nvPr/>
+      </p:nvGrpSpPr>
+      <p:grpSpPr>
+        <a:xfrm>
+          <a:off x="0" y="0"/>
+          <a:ext cx="0" cy="0"/>
+          <a:chOff x="0" y="0"/>
+          <a:chExt cx="0" cy="0"/>
+        </a:xfrm>
+      </p:grpSpPr>
+      <p:sp>
+        <p:nvSpPr>
+          <p:cNvPr id="2" name="Title 1"/>
+          <p:cNvSpPr>
+            <a:spLocks noGrp="1"/>
+          </p:cNvSpPr>
+          <p:nvPr>
+            <p:ph type="title"/>
+          </p:nvPr>
+        </p:nvSpPr>
+        <p:spPr/>
+        <p:txBody>
+          <a:bodyPr/>
+          <a:lstStyle/>
+          <a:p>
+            <a:r>
+              <a:rPr lang="en-US" dirty="0" smtClean="0"/>
+              <a:t>Objectives</a:t>
+            </a:r>
+            <a:endParaRPr lang="en-US" dirty="0"/>
+          </a:p>
+        </p:txBody>
+      </p:sp>
+      <p:sp>
+        <p:nvSpPr>
+          <p:cNvPr id="3" name="Content Placeholder 2"/>
+          <p:cNvSpPr>
+            <a:spLocks noGrp="1"/>
+          </p:cNvSpPr>
+          <p:nvPr>
+            <p:ph idx="1"/>
+          </p:nvPr>
+        </p:nvSpPr>
+        <p:spPr/>
+        <p:txBody>
+          <a:bodyPr>
+            <a:normAutofit fontScale="92500" lnSpcReduction="20000"/>
+          </a:bodyPr>
+          <a:lstStyle/>
+          <a:p>
+            <a:r>
+              <a:rPr lang="en-US" dirty="0" smtClean="0"/>
+              <a:t>General Structure of a Go Program</a:t>
+            </a:r>
+          </a:p>
+          <a:p>
+            <a:pPr lvl="1"/>
+            <a:r>
+              <a:rPr lang="en-US" dirty="0" smtClean="0"/>
+              <a:t>Package</a:t>
+            </a:r>
+          </a:p>
+          <a:p>
+            <a:pPr lvl="2"/>
+            <a:r>
+              <a:rPr lang="en-US" dirty="0" smtClean="0"/>
+              <a:t>Importance of the “main” package</a:t>
+            </a:r>
+          </a:p>
+          <a:p>
+            <a:pPr lvl="1"/>
+            <a:r>
+              <a:rPr lang="en-US" dirty="0" smtClean="0"/>
+              <a:t>imports</a:t>
+            </a:r>
+          </a:p>
+          <a:p>
+            <a:pPr lvl="1"/>
+            <a:r>
+              <a:rPr lang="en-US" dirty="0" smtClean="0"/>
+              <a:t>Program entry point</a:t>
+            </a:r>
+          </a:p>
+          <a:p>
+            <a:pPr lvl="2"/>
+            <a:r>
+              <a:rPr lang="en-US" dirty="0" smtClean="0"/>
+              <a:t>The “main” function</a:t>
+            </a:r>
+          </a:p>
+          <a:p>
+            <a:r>
+              <a:rPr lang="en-US" dirty="0" smtClean="0"/>
+              <a:t>Using the ‘go’ tool chain</a:t>
+            </a:r>
+          </a:p>
+          <a:p>
+            <a:pPr lvl="1"/>
+            <a:r>
+              <a:rPr lang="en-US" dirty="0" smtClean="0"/>
+              <a:t>Compiling your program</a:t>
+            </a:r>
+          </a:p>
+          <a:p>
+            <a:pPr lvl="2"/>
+            <a:r>
+              <a:rPr lang="en-US" dirty="0" smtClean="0"/>
+              <a:t>Building an executable</a:t>
+            </a:r>
+          </a:p>
+          <a:p>
+            <a:pPr lvl="2"/>
+            <a:r>
+              <a:rPr lang="en-US" dirty="0" smtClean="0"/>
+              <a:t>Installing an executable</a:t>
+            </a:r>
+          </a:p>
+          <a:p>
+            <a:pPr lvl="1"/>
+            <a:r>
+              <a:rPr lang="en-US" dirty="0" smtClean="0"/>
+              <a:t>Running your programming</a:t>
+            </a:r>
+          </a:p>
+        </p:txBody>
+      </p:sp>
+    </p:spTree>
+    <p:extLst>
+      <p:ext uri="{BB962C8B-B14F-4D97-AF65-F5344CB8AC3E}">
+        <p14:creationId xmlns:p14="http://schemas.microsoft.com/office/powerpoint/2010/main" val="4166209195"/>
+      </p:ext>
+    </p:extLst>
+  </p:cSld>
+  <p:clrMapOvr>
+    <a:masterClrMapping/>
+  </p:clrMapOvr>
+</p:sld>
+</file>
+
 <file path=ppt/slides/slide2.xml><?xml version="1.0" encoding="utf-8"?>
 <p:sld xmlns:a="http://schemas.openxmlformats.org/drawingml/2006/main" xmlns:r="http://schemas.openxmlformats.org/officeDocument/2006/relationships" xmlns:p="http://schemas.openxmlformats.org/presentationml/2006/main">
   <p:cSld>
@@ -8949,7 +10662,7 @@
           <a:p>
             <a:r>
               <a:rPr lang="en-US" dirty="0" smtClean="0"/>
-              <a:t>Chapter 01</a:t>
+              <a:t>Required Software Apps</a:t>
             </a:r>
             <a:endParaRPr lang="en-US" dirty="0"/>
           </a:p>
@@ -9056,6 +10769,230 @@
     <p:extLst>
       <p:ext uri="{BB962C8B-B14F-4D97-AF65-F5344CB8AC3E}">
         <p14:creationId xmlns:p14="http://schemas.microsoft.com/office/powerpoint/2010/main" val="3319010610"/>
+      </p:ext>
+    </p:extLst>
+  </p:cSld>
+  <p:clrMapOvr>
+    <a:masterClrMapping/>
+  </p:clrMapOvr>
+</p:sld>
+</file>
+
+<file path=ppt/slides/slide20.xml><?xml version="1.0" encoding="utf-8"?>
+<p:sld xmlns:a="http://schemas.openxmlformats.org/drawingml/2006/main" xmlns:r="http://schemas.openxmlformats.org/officeDocument/2006/relationships" xmlns:p="http://schemas.openxmlformats.org/presentationml/2006/main">
+  <p:cSld>
+    <p:spTree>
+      <p:nvGrpSpPr>
+        <p:cNvPr id="1" name=""/>
+        <p:cNvGrpSpPr/>
+        <p:nvPr/>
+      </p:nvGrpSpPr>
+      <p:grpSpPr>
+        <a:xfrm>
+          <a:off x="0" y="0"/>
+          <a:ext cx="0" cy="0"/>
+          <a:chOff x="0" y="0"/>
+          <a:chExt cx="0" cy="0"/>
+        </a:xfrm>
+      </p:grpSpPr>
+      <p:sp>
+        <p:nvSpPr>
+          <p:cNvPr id="2" name="Title 1"/>
+          <p:cNvSpPr>
+            <a:spLocks noGrp="1"/>
+          </p:cNvSpPr>
+          <p:nvPr>
+            <p:ph type="ctrTitle"/>
+          </p:nvPr>
+        </p:nvSpPr>
+        <p:spPr/>
+        <p:txBody>
+          <a:bodyPr/>
+          <a:lstStyle/>
+          <a:p>
+            <a:r>
+              <a:rPr lang="en-US" dirty="0" smtClean="0"/>
+              <a:t>Chapter </a:t>
+            </a:r>
+            <a:r>
+              <a:rPr lang="en-US" dirty="0" smtClean="0"/>
+              <a:t>2 </a:t>
+            </a:r>
+            <a:r>
+              <a:rPr lang="en-US" dirty="0" smtClean="0"/>
+              <a:t>– </a:t>
+            </a:r>
+            <a:r>
+              <a:rPr lang="en-US" dirty="0" smtClean="0"/>
+              <a:t>The Basics</a:t>
+            </a:r>
+            <a:endParaRPr lang="en-US" dirty="0"/>
+          </a:p>
+        </p:txBody>
+      </p:sp>
+      <p:sp>
+        <p:nvSpPr>
+          <p:cNvPr id="3" name="Subtitle 2"/>
+          <p:cNvSpPr>
+            <a:spLocks noGrp="1"/>
+          </p:cNvSpPr>
+          <p:nvPr>
+            <p:ph type="subTitle" idx="1"/>
+          </p:nvPr>
+        </p:nvSpPr>
+        <p:spPr/>
+        <p:txBody>
+          <a:bodyPr/>
+          <a:lstStyle/>
+          <a:p>
+            <a:r>
+              <a:rPr lang="en-US" dirty="0" smtClean="0"/>
+              <a:t>Section </a:t>
+            </a:r>
+            <a:r>
+              <a:rPr lang="en-US" dirty="0" smtClean="0"/>
+              <a:t>3</a:t>
+            </a:r>
+            <a:endParaRPr lang="en-US" dirty="0" smtClean="0"/>
+          </a:p>
+          <a:p>
+            <a:r>
+              <a:rPr lang="en-US" dirty="0" smtClean="0"/>
+              <a:t>Values, Variables, and Constants</a:t>
+            </a:r>
+            <a:endParaRPr lang="en-US" dirty="0"/>
+          </a:p>
+        </p:txBody>
+      </p:sp>
+    </p:spTree>
+    <p:extLst>
+      <p:ext uri="{BB962C8B-B14F-4D97-AF65-F5344CB8AC3E}">
+        <p14:creationId xmlns:p14="http://schemas.microsoft.com/office/powerpoint/2010/main" val="3585670712"/>
+      </p:ext>
+    </p:extLst>
+  </p:cSld>
+  <p:clrMapOvr>
+    <a:masterClrMapping/>
+  </p:clrMapOvr>
+  <p:timing>
+    <p:tnLst>
+      <p:par>
+        <p:cTn xmlns:p14="http://schemas.microsoft.com/office/powerpoint/2010/main" id="1" dur="indefinite" restart="never" nodeType="tmRoot"/>
+      </p:par>
+    </p:tnLst>
+  </p:timing>
+</p:sld>
+</file>
+
+<file path=ppt/slides/slide21.xml><?xml version="1.0" encoding="utf-8"?>
+<p:sld xmlns:a="http://schemas.openxmlformats.org/drawingml/2006/main" xmlns:r="http://schemas.openxmlformats.org/officeDocument/2006/relationships" xmlns:p="http://schemas.openxmlformats.org/presentationml/2006/main">
+  <p:cSld>
+    <p:spTree>
+      <p:nvGrpSpPr>
+        <p:cNvPr id="1" name=""/>
+        <p:cNvGrpSpPr/>
+        <p:nvPr/>
+      </p:nvGrpSpPr>
+      <p:grpSpPr>
+        <a:xfrm>
+          <a:off x="0" y="0"/>
+          <a:ext cx="0" cy="0"/>
+          <a:chOff x="0" y="0"/>
+          <a:chExt cx="0" cy="0"/>
+        </a:xfrm>
+      </p:grpSpPr>
+      <p:sp>
+        <p:nvSpPr>
+          <p:cNvPr id="2" name="Title 1"/>
+          <p:cNvSpPr>
+            <a:spLocks noGrp="1"/>
+          </p:cNvSpPr>
+          <p:nvPr>
+            <p:ph type="title"/>
+          </p:nvPr>
+        </p:nvSpPr>
+        <p:spPr/>
+        <p:txBody>
+          <a:bodyPr/>
+          <a:lstStyle/>
+          <a:p>
+            <a:r>
+              <a:rPr lang="en-US" dirty="0" smtClean="0"/>
+              <a:t>Objectives</a:t>
+            </a:r>
+            <a:endParaRPr lang="en-US" dirty="0"/>
+          </a:p>
+        </p:txBody>
+      </p:sp>
+      <p:sp>
+        <p:nvSpPr>
+          <p:cNvPr id="3" name="Content Placeholder 2"/>
+          <p:cNvSpPr>
+            <a:spLocks noGrp="1"/>
+          </p:cNvSpPr>
+          <p:nvPr>
+            <p:ph idx="1"/>
+          </p:nvPr>
+        </p:nvSpPr>
+        <p:spPr/>
+        <p:txBody>
+          <a:bodyPr/>
+          <a:lstStyle/>
+          <a:p>
+            <a:r>
+              <a:rPr lang="en-US" dirty="0" smtClean="0"/>
+              <a:t>Playing with Values</a:t>
+            </a:r>
+          </a:p>
+          <a:p>
+            <a:pPr lvl="1"/>
+            <a:r>
+              <a:rPr lang="en-US" dirty="0" smtClean="0"/>
+              <a:t>Integers</a:t>
+            </a:r>
+          </a:p>
+          <a:p>
+            <a:pPr lvl="1"/>
+            <a:r>
+              <a:rPr lang="en-US" dirty="0" smtClean="0"/>
+              <a:t>Strings</a:t>
+            </a:r>
+          </a:p>
+          <a:p>
+            <a:pPr lvl="1"/>
+            <a:r>
+              <a:rPr lang="en-US" dirty="0" smtClean="0"/>
+              <a:t>Booleans</a:t>
+            </a:r>
+          </a:p>
+          <a:p>
+            <a:pPr lvl="1"/>
+            <a:r>
+              <a:rPr lang="en-US" dirty="0" smtClean="0"/>
+              <a:t>Bytes</a:t>
+            </a:r>
+          </a:p>
+          <a:p>
+            <a:r>
+              <a:rPr lang="en-US" dirty="0" smtClean="0"/>
+              <a:t>Storing Values in Variables</a:t>
+            </a:r>
+          </a:p>
+          <a:p>
+            <a:r>
+              <a:rPr lang="en-US" dirty="0" smtClean="0"/>
+              <a:t>Storing Values in Constants</a:t>
+            </a:r>
+          </a:p>
+          <a:p>
+            <a:endParaRPr lang="en-US" dirty="0"/>
+          </a:p>
+        </p:txBody>
+      </p:sp>
+    </p:spTree>
+    <p:extLst>
+      <p:ext uri="{BB962C8B-B14F-4D97-AF65-F5344CB8AC3E}">
+        <p14:creationId xmlns:p14="http://schemas.microsoft.com/office/powerpoint/2010/main" val="348388122"/>
       </p:ext>
     </p:extLst>
   </p:cSld>
@@ -9147,6 +11084,971 @@
   <p:clrMapOvr>
     <a:masterClrMapping/>
   </p:clrMapOvr>
+</p:sld>
+</file>
+
+<file path=ppt/slides/slide4.xml><?xml version="1.0" encoding="utf-8"?>
+<p:sld xmlns:a="http://schemas.openxmlformats.org/drawingml/2006/main" xmlns:r="http://schemas.openxmlformats.org/officeDocument/2006/relationships" xmlns:p="http://schemas.openxmlformats.org/presentationml/2006/main">
+  <p:cSld>
+    <p:spTree>
+      <p:nvGrpSpPr>
+        <p:cNvPr id="1" name=""/>
+        <p:cNvGrpSpPr/>
+        <p:nvPr/>
+      </p:nvGrpSpPr>
+      <p:grpSpPr>
+        <a:xfrm>
+          <a:off x="0" y="0"/>
+          <a:ext cx="0" cy="0"/>
+          <a:chOff x="0" y="0"/>
+          <a:chExt cx="0" cy="0"/>
+        </a:xfrm>
+      </p:grpSpPr>
+      <p:sp>
+        <p:nvSpPr>
+          <p:cNvPr id="2" name="Title 1"/>
+          <p:cNvSpPr>
+            <a:spLocks noGrp="1"/>
+          </p:cNvSpPr>
+          <p:nvPr>
+            <p:ph type="ctrTitle"/>
+          </p:nvPr>
+        </p:nvSpPr>
+        <p:spPr/>
+        <p:txBody>
+          <a:bodyPr/>
+          <a:lstStyle/>
+          <a:p>
+            <a:r>
+              <a:rPr lang="en-US" dirty="0" smtClean="0"/>
+              <a:t>Chapter 1 – Installation and Setup</a:t>
+            </a:r>
+            <a:endParaRPr lang="en-US" dirty="0"/>
+          </a:p>
+        </p:txBody>
+      </p:sp>
+      <p:sp>
+        <p:nvSpPr>
+          <p:cNvPr id="3" name="Subtitle 2"/>
+          <p:cNvSpPr>
+            <a:spLocks noGrp="1"/>
+          </p:cNvSpPr>
+          <p:nvPr>
+            <p:ph type="subTitle" idx="1"/>
+          </p:nvPr>
+        </p:nvSpPr>
+        <p:spPr/>
+        <p:txBody>
+          <a:bodyPr/>
+          <a:lstStyle/>
+          <a:p>
+            <a:r>
+              <a:rPr lang="en-US" dirty="0" smtClean="0"/>
+              <a:t>Section 1</a:t>
+            </a:r>
+          </a:p>
+          <a:p>
+            <a:r>
+              <a:rPr lang="en-US" dirty="0" smtClean="0"/>
+              <a:t>Go Tools Installation for Windows</a:t>
+            </a:r>
+            <a:endParaRPr lang="en-US" dirty="0"/>
+          </a:p>
+        </p:txBody>
+      </p:sp>
+    </p:spTree>
+    <p:extLst>
+      <p:ext uri="{BB962C8B-B14F-4D97-AF65-F5344CB8AC3E}">
+        <p14:creationId xmlns:p14="http://schemas.microsoft.com/office/powerpoint/2010/main" val="2523217411"/>
+      </p:ext>
+    </p:extLst>
+  </p:cSld>
+  <p:clrMapOvr>
+    <a:masterClrMapping/>
+  </p:clrMapOvr>
+  <p:timing>
+    <p:tnLst>
+      <p:par>
+        <p:cTn xmlns:p14="http://schemas.microsoft.com/office/powerpoint/2010/main" id="1" dur="indefinite" restart="never" nodeType="tmRoot"/>
+      </p:par>
+    </p:tnLst>
+  </p:timing>
+</p:sld>
+</file>
+
+<file path=ppt/slides/slide5.xml><?xml version="1.0" encoding="utf-8"?>
+<p:sld xmlns:a="http://schemas.openxmlformats.org/drawingml/2006/main" xmlns:r="http://schemas.openxmlformats.org/officeDocument/2006/relationships" xmlns:p="http://schemas.openxmlformats.org/presentationml/2006/main">
+  <p:cSld>
+    <p:spTree>
+      <p:nvGrpSpPr>
+        <p:cNvPr id="1" name=""/>
+        <p:cNvGrpSpPr/>
+        <p:nvPr/>
+      </p:nvGrpSpPr>
+      <p:grpSpPr>
+        <a:xfrm>
+          <a:off x="0" y="0"/>
+          <a:ext cx="0" cy="0"/>
+          <a:chOff x="0" y="0"/>
+          <a:chExt cx="0" cy="0"/>
+        </a:xfrm>
+      </p:grpSpPr>
+      <p:sp>
+        <p:nvSpPr>
+          <p:cNvPr id="2" name="Title 1"/>
+          <p:cNvSpPr>
+            <a:spLocks noGrp="1"/>
+          </p:cNvSpPr>
+          <p:nvPr>
+            <p:ph type="title"/>
+          </p:nvPr>
+        </p:nvSpPr>
+        <p:spPr/>
+        <p:txBody>
+          <a:bodyPr/>
+          <a:lstStyle/>
+          <a:p>
+            <a:r>
+              <a:rPr lang="en-US" dirty="0" smtClean="0"/>
+              <a:t>Windows Installation</a:t>
+            </a:r>
+            <a:endParaRPr lang="en-US" dirty="0"/>
+          </a:p>
+        </p:txBody>
+      </p:sp>
+      <p:sp>
+        <p:nvSpPr>
+          <p:cNvPr id="3" name="Content Placeholder 2"/>
+          <p:cNvSpPr>
+            <a:spLocks noGrp="1"/>
+          </p:cNvSpPr>
+          <p:nvPr>
+            <p:ph idx="1"/>
+          </p:nvPr>
+        </p:nvSpPr>
+        <p:spPr/>
+        <p:txBody>
+          <a:bodyPr>
+            <a:normAutofit fontScale="85000" lnSpcReduction="10000"/>
+          </a:bodyPr>
+          <a:lstStyle/>
+          <a:p>
+            <a:pPr marL="514350" indent="-514350">
+              <a:buFont typeface="+mj-lt"/>
+              <a:buAutoNum type="arabicPeriod"/>
+            </a:pPr>
+            <a:r>
+              <a:rPr lang="en-US" dirty="0" smtClean="0"/>
+              <a:t>Download the ‘Required Software’ for your platform:</a:t>
+            </a:r>
+          </a:p>
+          <a:p>
+            <a:pPr marL="514350" indent="-514350">
+              <a:buFont typeface="+mj-lt"/>
+              <a:buAutoNum type="arabicPeriod"/>
+            </a:pPr>
+            <a:r>
+              <a:rPr lang="en-US" dirty="0" smtClean="0"/>
+              <a:t>Install </a:t>
+            </a:r>
+            <a:r>
+              <a:rPr lang="en-US" dirty="0" err="1" smtClean="0"/>
+              <a:t>Git</a:t>
+            </a:r>
+            <a:endParaRPr lang="en-US" dirty="0" smtClean="0"/>
+          </a:p>
+          <a:p>
+            <a:pPr marL="914400" lvl="1" indent="-514350"/>
+            <a:r>
+              <a:rPr lang="en-US" dirty="0" smtClean="0"/>
+              <a:t>Create a .</a:t>
+            </a:r>
+            <a:r>
+              <a:rPr lang="en-US" dirty="0" err="1" smtClean="0"/>
+              <a:t>gitconfig</a:t>
+            </a:r>
+            <a:r>
+              <a:rPr lang="en-US" dirty="0" smtClean="0"/>
+              <a:t> file in %HOME%\.</a:t>
+            </a:r>
+            <a:r>
+              <a:rPr lang="en-US" dirty="0" err="1" smtClean="0"/>
+              <a:t>gitconf</a:t>
+            </a:r>
+            <a:r>
+              <a:rPr lang="en-US" dirty="0" smtClean="0"/>
+              <a:t>:</a:t>
+            </a:r>
+          </a:p>
+          <a:p>
+            <a:pPr marL="1314450" lvl="2" indent="-514350"/>
+            <a:r>
+              <a:rPr lang="en-US" dirty="0" smtClean="0"/>
+              <a:t>&gt; </a:t>
+            </a:r>
+            <a:r>
+              <a:rPr lang="en-US" dirty="0" err="1" smtClean="0"/>
+              <a:t>git</a:t>
+            </a:r>
+            <a:r>
+              <a:rPr lang="en-US" dirty="0" smtClean="0"/>
+              <a:t> </a:t>
+            </a:r>
+            <a:r>
+              <a:rPr lang="en-US" dirty="0" err="1" smtClean="0"/>
+              <a:t>config</a:t>
+            </a:r>
+            <a:r>
+              <a:rPr lang="en-US" dirty="0" smtClean="0"/>
+              <a:t> --global </a:t>
+            </a:r>
+            <a:r>
+              <a:rPr lang="en-US" dirty="0" err="1" smtClean="0"/>
+              <a:t>user.email</a:t>
+            </a:r>
+            <a:r>
+              <a:rPr lang="en-US" dirty="0" smtClean="0"/>
+              <a:t> </a:t>
+            </a:r>
+            <a:r>
+              <a:rPr lang="en-US" dirty="0" smtClean="0">
+                <a:hlinkClick r:id="rId2"/>
+              </a:rPr>
+              <a:t>“your@email.com</a:t>
+            </a:r>
+            <a:r>
+              <a:rPr lang="en-US" dirty="0" smtClean="0"/>
+              <a:t>”</a:t>
+            </a:r>
+          </a:p>
+          <a:p>
+            <a:pPr marL="1314450" lvl="2" indent="-514350"/>
+            <a:r>
+              <a:rPr lang="en-US" dirty="0" smtClean="0"/>
+              <a:t>&gt; </a:t>
+            </a:r>
+            <a:r>
+              <a:rPr lang="en-US" dirty="0" err="1" smtClean="0"/>
+              <a:t>git</a:t>
+            </a:r>
+            <a:r>
+              <a:rPr lang="en-US" dirty="0" smtClean="0"/>
+              <a:t> </a:t>
+            </a:r>
+            <a:r>
+              <a:rPr lang="en-US" dirty="0" err="1" smtClean="0"/>
+              <a:t>config</a:t>
+            </a:r>
+            <a:r>
+              <a:rPr lang="en-US" dirty="0" smtClean="0"/>
+              <a:t> --global </a:t>
+            </a:r>
+            <a:r>
+              <a:rPr lang="en-US" dirty="0" err="1" smtClean="0"/>
+              <a:t>user.name</a:t>
+            </a:r>
+            <a:r>
+              <a:rPr lang="en-US" dirty="0" smtClean="0"/>
+              <a:t> “your name”</a:t>
+            </a:r>
+          </a:p>
+          <a:p>
+            <a:pPr marL="514350" indent="-514350">
+              <a:buFont typeface="+mj-lt"/>
+              <a:buAutoNum type="arabicPeriod"/>
+            </a:pPr>
+            <a:r>
+              <a:rPr lang="en-US" dirty="0" smtClean="0"/>
+              <a:t>Install Go tools</a:t>
+            </a:r>
+          </a:p>
+          <a:p>
+            <a:pPr marL="914400" lvl="1" indent="-514350">
+              <a:buFont typeface="+mj-lt"/>
+              <a:buAutoNum type="arabicPeriod"/>
+            </a:pPr>
+            <a:r>
+              <a:rPr lang="en-US" dirty="0" smtClean="0"/>
+              <a:t>Create GOPATH home directory</a:t>
+            </a:r>
+          </a:p>
+          <a:p>
+            <a:pPr marL="1314450" lvl="2" indent="-514350"/>
+            <a:r>
+              <a:rPr lang="en-US" dirty="0"/>
+              <a:t>$ </a:t>
+            </a:r>
+            <a:r>
+              <a:rPr lang="en-US" dirty="0" err="1" smtClean="0"/>
+              <a:t>mkdir</a:t>
+            </a:r>
+            <a:r>
+              <a:rPr lang="en-US" dirty="0" smtClean="0"/>
+              <a:t> </a:t>
+            </a:r>
+            <a:r>
+              <a:rPr lang="en-US" dirty="0"/>
+              <a:t>%</a:t>
+            </a:r>
+            <a:r>
+              <a:rPr lang="en-US" dirty="0" smtClean="0"/>
+              <a:t>HOME%\</a:t>
+            </a:r>
+            <a:r>
+              <a:rPr lang="en-US" dirty="0" err="1" smtClean="0"/>
+              <a:t>lcp</a:t>
+            </a:r>
+            <a:endParaRPr lang="en-US" dirty="0"/>
+          </a:p>
+          <a:p>
+            <a:pPr marL="1314450" lvl="2" indent="-514350"/>
+            <a:r>
+              <a:rPr lang="en-US" dirty="0"/>
+              <a:t>$ </a:t>
+            </a:r>
+            <a:r>
+              <a:rPr lang="en-US" dirty="0" err="1"/>
+              <a:t>mkdir</a:t>
+            </a:r>
+            <a:r>
+              <a:rPr lang="en-US" dirty="0"/>
+              <a:t> </a:t>
+            </a:r>
+            <a:r>
+              <a:rPr lang="en-US" dirty="0" smtClean="0"/>
+              <a:t>%HOME%\</a:t>
+            </a:r>
+            <a:r>
+              <a:rPr lang="en-US" dirty="0" err="1" smtClean="0"/>
+              <a:t>lcp</a:t>
+            </a:r>
+            <a:r>
+              <a:rPr lang="en-US" dirty="0" smtClean="0"/>
+              <a:t>\go</a:t>
+            </a:r>
+            <a:r>
+              <a:rPr lang="en-US" dirty="0"/>
+              <a:t>-</a:t>
+            </a:r>
+            <a:r>
+              <a:rPr lang="en-US" dirty="0" err="1"/>
+              <a:t>lang</a:t>
+            </a:r>
+            <a:r>
+              <a:rPr lang="en-US" dirty="0"/>
+              <a:t>-</a:t>
+            </a:r>
+            <a:r>
+              <a:rPr lang="en-US" dirty="0" smtClean="0"/>
+              <a:t>programming</a:t>
+            </a:r>
+          </a:p>
+          <a:p>
+            <a:pPr marL="914400" lvl="1" indent="-514350">
+              <a:buFont typeface="+mj-lt"/>
+              <a:buAutoNum type="arabicPeriod"/>
+            </a:pPr>
+            <a:r>
+              <a:rPr lang="en-US" dirty="0" smtClean="0"/>
+              <a:t>Set GOPATH </a:t>
+            </a:r>
+            <a:r>
+              <a:rPr lang="en-US" dirty="0" err="1" smtClean="0"/>
+              <a:t>env</a:t>
+            </a:r>
+            <a:r>
+              <a:rPr lang="en-US" dirty="0" smtClean="0"/>
+              <a:t> to point this directory</a:t>
+            </a:r>
+          </a:p>
+          <a:p>
+            <a:pPr marL="514350" indent="-514350">
+              <a:buFont typeface="+mj-lt"/>
+              <a:buAutoNum type="arabicPeriod"/>
+            </a:pPr>
+            <a:r>
+              <a:rPr lang="en-US" dirty="0" smtClean="0"/>
+              <a:t>Install Visual Studio Code</a:t>
+            </a:r>
+          </a:p>
+        </p:txBody>
+      </p:sp>
+    </p:spTree>
+    <p:extLst>
+      <p:ext uri="{BB962C8B-B14F-4D97-AF65-F5344CB8AC3E}">
+        <p14:creationId xmlns:p14="http://schemas.microsoft.com/office/powerpoint/2010/main" val="4055501964"/>
+      </p:ext>
+    </p:extLst>
+  </p:cSld>
+  <p:clrMapOvr>
+    <a:masterClrMapping/>
+  </p:clrMapOvr>
+  <p:timing>
+    <p:tnLst>
+      <p:par>
+        <p:cTn xmlns:p14="http://schemas.microsoft.com/office/powerpoint/2010/main" id="1" dur="indefinite" restart="never" nodeType="tmRoot"/>
+      </p:par>
+    </p:tnLst>
+  </p:timing>
+</p:sld>
+</file>
+
+<file path=ppt/slides/slide6.xml><?xml version="1.0" encoding="utf-8"?>
+<p:sld xmlns:a="http://schemas.openxmlformats.org/drawingml/2006/main" xmlns:r="http://schemas.openxmlformats.org/officeDocument/2006/relationships" xmlns:p="http://schemas.openxmlformats.org/presentationml/2006/main">
+  <p:cSld>
+    <p:spTree>
+      <p:nvGrpSpPr>
+        <p:cNvPr id="1" name=""/>
+        <p:cNvGrpSpPr/>
+        <p:nvPr/>
+      </p:nvGrpSpPr>
+      <p:grpSpPr>
+        <a:xfrm>
+          <a:off x="0" y="0"/>
+          <a:ext cx="0" cy="0"/>
+          <a:chOff x="0" y="0"/>
+          <a:chExt cx="0" cy="0"/>
+        </a:xfrm>
+      </p:grpSpPr>
+      <p:sp>
+        <p:nvSpPr>
+          <p:cNvPr id="2" name="Title 1"/>
+          <p:cNvSpPr>
+            <a:spLocks noGrp="1"/>
+          </p:cNvSpPr>
+          <p:nvPr>
+            <p:ph type="ctrTitle"/>
+          </p:nvPr>
+        </p:nvSpPr>
+        <p:spPr/>
+        <p:txBody>
+          <a:bodyPr/>
+          <a:lstStyle/>
+          <a:p>
+            <a:r>
+              <a:rPr lang="en-US" dirty="0" smtClean="0"/>
+              <a:t>Chapter 1 – Installation and Setup</a:t>
+            </a:r>
+            <a:endParaRPr lang="en-US" dirty="0"/>
+          </a:p>
+        </p:txBody>
+      </p:sp>
+      <p:sp>
+        <p:nvSpPr>
+          <p:cNvPr id="3" name="Subtitle 2"/>
+          <p:cNvSpPr>
+            <a:spLocks noGrp="1"/>
+          </p:cNvSpPr>
+          <p:nvPr>
+            <p:ph type="subTitle" idx="1"/>
+          </p:nvPr>
+        </p:nvSpPr>
+        <p:spPr/>
+        <p:txBody>
+          <a:bodyPr/>
+          <a:lstStyle/>
+          <a:p>
+            <a:r>
+              <a:rPr lang="en-US" dirty="0" smtClean="0"/>
+              <a:t>Section 2</a:t>
+            </a:r>
+          </a:p>
+          <a:p>
+            <a:r>
+              <a:rPr lang="en-US" dirty="0" smtClean="0"/>
+              <a:t>Go Tools and Plugin Setup for Mac OS X</a:t>
+            </a:r>
+            <a:endParaRPr lang="en-US" dirty="0"/>
+          </a:p>
+        </p:txBody>
+      </p:sp>
+    </p:spTree>
+    <p:extLst>
+      <p:ext uri="{BB962C8B-B14F-4D97-AF65-F5344CB8AC3E}">
+        <p14:creationId xmlns:p14="http://schemas.microsoft.com/office/powerpoint/2010/main" val="3739103140"/>
+      </p:ext>
+    </p:extLst>
+  </p:cSld>
+  <p:clrMapOvr>
+    <a:masterClrMapping/>
+  </p:clrMapOvr>
+  <p:timing>
+    <p:tnLst>
+      <p:par>
+        <p:cTn xmlns:p14="http://schemas.microsoft.com/office/powerpoint/2010/main" id="1" dur="indefinite" restart="never" nodeType="tmRoot"/>
+      </p:par>
+    </p:tnLst>
+  </p:timing>
+</p:sld>
+</file>
+
+<file path=ppt/slides/slide7.xml><?xml version="1.0" encoding="utf-8"?>
+<p:sld xmlns:a="http://schemas.openxmlformats.org/drawingml/2006/main" xmlns:r="http://schemas.openxmlformats.org/officeDocument/2006/relationships" xmlns:p="http://schemas.openxmlformats.org/presentationml/2006/main">
+  <p:cSld>
+    <p:spTree>
+      <p:nvGrpSpPr>
+        <p:cNvPr id="1" name=""/>
+        <p:cNvGrpSpPr/>
+        <p:nvPr/>
+      </p:nvGrpSpPr>
+      <p:grpSpPr>
+        <a:xfrm>
+          <a:off x="0" y="0"/>
+          <a:ext cx="0" cy="0"/>
+          <a:chOff x="0" y="0"/>
+          <a:chExt cx="0" cy="0"/>
+        </a:xfrm>
+      </p:grpSpPr>
+      <p:sp>
+        <p:nvSpPr>
+          <p:cNvPr id="2" name="Title 1"/>
+          <p:cNvSpPr>
+            <a:spLocks noGrp="1"/>
+          </p:cNvSpPr>
+          <p:nvPr>
+            <p:ph type="title"/>
+          </p:nvPr>
+        </p:nvSpPr>
+        <p:spPr/>
+        <p:txBody>
+          <a:bodyPr/>
+          <a:lstStyle/>
+          <a:p>
+            <a:r>
+              <a:rPr lang="en-US" dirty="0" smtClean="0"/>
+              <a:t>Mac OS X Installation</a:t>
+            </a:r>
+            <a:endParaRPr lang="en-US" dirty="0"/>
+          </a:p>
+        </p:txBody>
+      </p:sp>
+      <p:sp>
+        <p:nvSpPr>
+          <p:cNvPr id="3" name="Content Placeholder 2"/>
+          <p:cNvSpPr>
+            <a:spLocks noGrp="1"/>
+          </p:cNvSpPr>
+          <p:nvPr>
+            <p:ph idx="1"/>
+          </p:nvPr>
+        </p:nvSpPr>
+        <p:spPr/>
+        <p:txBody>
+          <a:bodyPr>
+            <a:normAutofit fontScale="85000" lnSpcReduction="10000"/>
+          </a:bodyPr>
+          <a:lstStyle/>
+          <a:p>
+            <a:pPr marL="514350" indent="-514350">
+              <a:buFont typeface="+mj-lt"/>
+              <a:buAutoNum type="arabicPeriod"/>
+            </a:pPr>
+            <a:r>
+              <a:rPr lang="en-US" dirty="0"/>
+              <a:t>Download the ‘Required Software’ for your platform</a:t>
+            </a:r>
+            <a:r>
+              <a:rPr lang="en-US" dirty="0" smtClean="0"/>
+              <a:t>:</a:t>
+            </a:r>
+          </a:p>
+          <a:p>
+            <a:pPr marL="514350" indent="-514350">
+              <a:buFont typeface="+mj-lt"/>
+              <a:buAutoNum type="arabicPeriod"/>
+            </a:pPr>
+            <a:r>
+              <a:rPr lang="en-US" dirty="0" smtClean="0"/>
+              <a:t>Install </a:t>
+            </a:r>
+            <a:r>
+              <a:rPr lang="en-US" dirty="0" err="1" smtClean="0"/>
+              <a:t>Git</a:t>
+            </a:r>
+            <a:endParaRPr lang="en-US" dirty="0" smtClean="0"/>
+          </a:p>
+          <a:p>
+            <a:pPr marL="914400" lvl="1" indent="-514350"/>
+            <a:r>
+              <a:rPr lang="en-US" dirty="0" smtClean="0"/>
+              <a:t>Create a .</a:t>
+            </a:r>
+            <a:r>
+              <a:rPr lang="en-US" dirty="0" err="1" smtClean="0"/>
+              <a:t>gitconfig</a:t>
+            </a:r>
+            <a:r>
+              <a:rPr lang="en-US" dirty="0" smtClean="0"/>
+              <a:t> file in $HOME/.</a:t>
+            </a:r>
+            <a:r>
+              <a:rPr lang="en-US" dirty="0" err="1" smtClean="0"/>
+              <a:t>gitconf</a:t>
+            </a:r>
+            <a:r>
+              <a:rPr lang="en-US" dirty="0" smtClean="0"/>
+              <a:t>:</a:t>
+            </a:r>
+          </a:p>
+          <a:p>
+            <a:pPr marL="1314450" lvl="2" indent="-514350"/>
+            <a:r>
+              <a:rPr lang="en-US" dirty="0" smtClean="0"/>
+              <a:t>$ </a:t>
+            </a:r>
+            <a:r>
+              <a:rPr lang="en-US" dirty="0" err="1" smtClean="0"/>
+              <a:t>git</a:t>
+            </a:r>
+            <a:r>
+              <a:rPr lang="en-US" dirty="0" smtClean="0"/>
+              <a:t> </a:t>
+            </a:r>
+            <a:r>
+              <a:rPr lang="en-US" dirty="0" err="1" smtClean="0"/>
+              <a:t>config</a:t>
+            </a:r>
+            <a:r>
+              <a:rPr lang="en-US" dirty="0" smtClean="0"/>
+              <a:t> --global </a:t>
+            </a:r>
+            <a:r>
+              <a:rPr lang="en-US" dirty="0" err="1" smtClean="0"/>
+              <a:t>user.email</a:t>
+            </a:r>
+            <a:r>
+              <a:rPr lang="en-US" dirty="0" smtClean="0"/>
+              <a:t> </a:t>
+            </a:r>
+            <a:r>
+              <a:rPr lang="en-US" dirty="0" smtClean="0">
+                <a:hlinkClick r:id="rId2"/>
+              </a:rPr>
+              <a:t>“your@email.com</a:t>
+            </a:r>
+            <a:r>
+              <a:rPr lang="en-US" dirty="0" smtClean="0"/>
+              <a:t>”</a:t>
+            </a:r>
+          </a:p>
+          <a:p>
+            <a:pPr marL="1314450" lvl="2" indent="-514350"/>
+            <a:r>
+              <a:rPr lang="en-US" dirty="0" smtClean="0"/>
+              <a:t>$ </a:t>
+            </a:r>
+            <a:r>
+              <a:rPr lang="en-US" dirty="0" err="1" smtClean="0"/>
+              <a:t>git</a:t>
+            </a:r>
+            <a:r>
+              <a:rPr lang="en-US" dirty="0" smtClean="0"/>
+              <a:t> </a:t>
+            </a:r>
+            <a:r>
+              <a:rPr lang="en-US" dirty="0" err="1" smtClean="0"/>
+              <a:t>config</a:t>
+            </a:r>
+            <a:r>
+              <a:rPr lang="en-US" dirty="0" smtClean="0"/>
+              <a:t> --global </a:t>
+            </a:r>
+            <a:r>
+              <a:rPr lang="en-US" dirty="0" err="1" smtClean="0"/>
+              <a:t>user.name</a:t>
+            </a:r>
+            <a:r>
+              <a:rPr lang="en-US" dirty="0" smtClean="0"/>
+              <a:t> “your name”</a:t>
+            </a:r>
+          </a:p>
+          <a:p>
+            <a:pPr marL="514350" indent="-514350">
+              <a:buFont typeface="+mj-lt"/>
+              <a:buAutoNum type="arabicPeriod"/>
+            </a:pPr>
+            <a:r>
+              <a:rPr lang="en-US" dirty="0" smtClean="0"/>
+              <a:t>Install Go tools</a:t>
+            </a:r>
+          </a:p>
+          <a:p>
+            <a:pPr marL="914400" lvl="1" indent="-514350">
+              <a:buFont typeface="+mj-lt"/>
+              <a:buAutoNum type="arabicPeriod"/>
+            </a:pPr>
+            <a:r>
+              <a:rPr lang="en-US" dirty="0" smtClean="0"/>
+              <a:t>Create GOPATH home directory </a:t>
+            </a:r>
+          </a:p>
+          <a:p>
+            <a:pPr marL="1314450" lvl="2" indent="-514350"/>
+            <a:r>
+              <a:rPr lang="en-US" dirty="0" smtClean="0"/>
+              <a:t>$ </a:t>
+            </a:r>
+            <a:r>
+              <a:rPr lang="en-US" dirty="0" err="1"/>
+              <a:t>mkdir</a:t>
+            </a:r>
+            <a:r>
+              <a:rPr lang="en-US" dirty="0"/>
+              <a:t> –p $HOME/</a:t>
+            </a:r>
+            <a:r>
+              <a:rPr lang="en-US" dirty="0" err="1"/>
+              <a:t>lcp</a:t>
+            </a:r>
+            <a:r>
+              <a:rPr lang="en-US" dirty="0"/>
+              <a:t>/go-</a:t>
+            </a:r>
+            <a:r>
+              <a:rPr lang="en-US" dirty="0" err="1"/>
+              <a:t>lang</a:t>
+            </a:r>
+            <a:r>
+              <a:rPr lang="en-US" dirty="0"/>
+              <a:t>-</a:t>
+            </a:r>
+            <a:r>
+              <a:rPr lang="en-US" dirty="0" smtClean="0"/>
+              <a:t>programming</a:t>
+            </a:r>
+          </a:p>
+          <a:p>
+            <a:pPr marL="914400" lvl="1" indent="-514350">
+              <a:buFont typeface="+mj-lt"/>
+              <a:buAutoNum type="arabicPeriod"/>
+            </a:pPr>
+            <a:r>
+              <a:rPr lang="en-US" dirty="0" smtClean="0"/>
+              <a:t>Set GOPATH </a:t>
+            </a:r>
+            <a:r>
+              <a:rPr lang="en-US" dirty="0" err="1" smtClean="0"/>
+              <a:t>env</a:t>
+            </a:r>
+            <a:r>
+              <a:rPr lang="en-US" dirty="0" smtClean="0"/>
+              <a:t> to point this directory</a:t>
+            </a:r>
+          </a:p>
+          <a:p>
+            <a:pPr marL="514350" indent="-514350">
+              <a:buFont typeface="+mj-lt"/>
+              <a:buAutoNum type="arabicPeriod"/>
+            </a:pPr>
+            <a:r>
+              <a:rPr lang="en-US" dirty="0" smtClean="0"/>
+              <a:t>Install Visual Studio Code</a:t>
+            </a:r>
+          </a:p>
+          <a:p>
+            <a:pPr marL="914400" lvl="1" indent="-514350"/>
+            <a:r>
+              <a:rPr lang="en-US" dirty="0" smtClean="0"/>
+              <a:t>Install Go plugin</a:t>
+            </a:r>
+          </a:p>
+        </p:txBody>
+      </p:sp>
+    </p:spTree>
+    <p:extLst>
+      <p:ext uri="{BB962C8B-B14F-4D97-AF65-F5344CB8AC3E}">
+        <p14:creationId xmlns:p14="http://schemas.microsoft.com/office/powerpoint/2010/main" val="1540016519"/>
+      </p:ext>
+    </p:extLst>
+  </p:cSld>
+  <p:clrMapOvr>
+    <a:masterClrMapping/>
+  </p:clrMapOvr>
+  <p:timing>
+    <p:tnLst>
+      <p:par>
+        <p:cTn xmlns:p14="http://schemas.microsoft.com/office/powerpoint/2010/main" id="1" dur="indefinite" restart="never" nodeType="tmRoot"/>
+      </p:par>
+    </p:tnLst>
+  </p:timing>
+</p:sld>
+</file>
+
+<file path=ppt/slides/slide8.xml><?xml version="1.0" encoding="utf-8"?>
+<p:sld xmlns:a="http://schemas.openxmlformats.org/drawingml/2006/main" xmlns:r="http://schemas.openxmlformats.org/officeDocument/2006/relationships" xmlns:p="http://schemas.openxmlformats.org/presentationml/2006/main">
+  <p:cSld>
+    <p:spTree>
+      <p:nvGrpSpPr>
+        <p:cNvPr id="1" name=""/>
+        <p:cNvGrpSpPr/>
+        <p:nvPr/>
+      </p:nvGrpSpPr>
+      <p:grpSpPr>
+        <a:xfrm>
+          <a:off x="0" y="0"/>
+          <a:ext cx="0" cy="0"/>
+          <a:chOff x="0" y="0"/>
+          <a:chExt cx="0" cy="0"/>
+        </a:xfrm>
+      </p:grpSpPr>
+      <p:sp>
+        <p:nvSpPr>
+          <p:cNvPr id="2" name="Title 1"/>
+          <p:cNvSpPr>
+            <a:spLocks noGrp="1"/>
+          </p:cNvSpPr>
+          <p:nvPr>
+            <p:ph type="ctrTitle"/>
+          </p:nvPr>
+        </p:nvSpPr>
+        <p:spPr/>
+        <p:txBody>
+          <a:bodyPr/>
+          <a:lstStyle/>
+          <a:p>
+            <a:r>
+              <a:rPr lang="en-US" dirty="0" smtClean="0"/>
+              <a:t>Chapter 1 – Installation and Setup</a:t>
+            </a:r>
+            <a:endParaRPr lang="en-US" dirty="0"/>
+          </a:p>
+        </p:txBody>
+      </p:sp>
+      <p:sp>
+        <p:nvSpPr>
+          <p:cNvPr id="3" name="Subtitle 2"/>
+          <p:cNvSpPr>
+            <a:spLocks noGrp="1"/>
+          </p:cNvSpPr>
+          <p:nvPr>
+            <p:ph type="subTitle" idx="1"/>
+          </p:nvPr>
+        </p:nvSpPr>
+        <p:spPr/>
+        <p:txBody>
+          <a:bodyPr/>
+          <a:lstStyle/>
+          <a:p>
+            <a:r>
+              <a:rPr lang="en-US" dirty="0" smtClean="0"/>
+              <a:t>Section 3</a:t>
+            </a:r>
+          </a:p>
+          <a:p>
+            <a:r>
+              <a:rPr lang="en-US" dirty="0" smtClean="0"/>
+              <a:t>Go Plugin Setup for Windows</a:t>
+            </a:r>
+            <a:endParaRPr lang="en-US" dirty="0"/>
+          </a:p>
+        </p:txBody>
+      </p:sp>
+    </p:spTree>
+    <p:extLst>
+      <p:ext uri="{BB962C8B-B14F-4D97-AF65-F5344CB8AC3E}">
+        <p14:creationId xmlns:p14="http://schemas.microsoft.com/office/powerpoint/2010/main" val="330395976"/>
+      </p:ext>
+    </p:extLst>
+  </p:cSld>
+  <p:clrMapOvr>
+    <a:masterClrMapping/>
+  </p:clrMapOvr>
+  <p:timing>
+    <p:tnLst>
+      <p:par>
+        <p:cTn xmlns:p14="http://schemas.microsoft.com/office/powerpoint/2010/main" id="1" dur="indefinite" restart="never" nodeType="tmRoot"/>
+      </p:par>
+    </p:tnLst>
+  </p:timing>
+</p:sld>
+</file>
+
+<file path=ppt/slides/slide9.xml><?xml version="1.0" encoding="utf-8"?>
+<p:sld xmlns:a="http://schemas.openxmlformats.org/drawingml/2006/main" xmlns:r="http://schemas.openxmlformats.org/officeDocument/2006/relationships" xmlns:p="http://schemas.openxmlformats.org/presentationml/2006/main">
+  <p:cSld>
+    <p:spTree>
+      <p:nvGrpSpPr>
+        <p:cNvPr id="1" name=""/>
+        <p:cNvGrpSpPr/>
+        <p:nvPr/>
+      </p:nvGrpSpPr>
+      <p:grpSpPr>
+        <a:xfrm>
+          <a:off x="0" y="0"/>
+          <a:ext cx="0" cy="0"/>
+          <a:chOff x="0" y="0"/>
+          <a:chExt cx="0" cy="0"/>
+        </a:xfrm>
+      </p:grpSpPr>
+      <p:sp>
+        <p:nvSpPr>
+          <p:cNvPr id="2" name="Title 1"/>
+          <p:cNvSpPr>
+            <a:spLocks noGrp="1"/>
+          </p:cNvSpPr>
+          <p:nvPr>
+            <p:ph type="ctrTitle"/>
+          </p:nvPr>
+        </p:nvSpPr>
+        <p:spPr/>
+        <p:txBody>
+          <a:bodyPr/>
+          <a:lstStyle/>
+          <a:p>
+            <a:r>
+              <a:rPr lang="en-US" dirty="0" smtClean="0"/>
+              <a:t>Chapter 1 – Installation and Setup</a:t>
+            </a:r>
+            <a:endParaRPr lang="en-US" dirty="0"/>
+          </a:p>
+        </p:txBody>
+      </p:sp>
+      <p:sp>
+        <p:nvSpPr>
+          <p:cNvPr id="3" name="Subtitle 2"/>
+          <p:cNvSpPr>
+            <a:spLocks noGrp="1"/>
+          </p:cNvSpPr>
+          <p:nvPr>
+            <p:ph type="subTitle" idx="1"/>
+          </p:nvPr>
+        </p:nvSpPr>
+        <p:spPr/>
+        <p:txBody>
+          <a:bodyPr/>
+          <a:lstStyle/>
+          <a:p>
+            <a:r>
+              <a:rPr lang="en-US" dirty="0" smtClean="0"/>
+              <a:t>Section 4</a:t>
+            </a:r>
+          </a:p>
+          <a:p>
+            <a:r>
+              <a:rPr lang="en-US" dirty="0" smtClean="0"/>
+              <a:t>Go Tools and Plugin Setup for Linux</a:t>
+            </a:r>
+            <a:endParaRPr lang="en-US" dirty="0"/>
+          </a:p>
+        </p:txBody>
+      </p:sp>
+    </p:spTree>
+    <p:extLst>
+      <p:ext uri="{BB962C8B-B14F-4D97-AF65-F5344CB8AC3E}">
+        <p14:creationId xmlns:p14="http://schemas.microsoft.com/office/powerpoint/2010/main" val="1590318880"/>
+      </p:ext>
+    </p:extLst>
+  </p:cSld>
+  <p:clrMapOvr>
+    <a:masterClrMapping/>
+  </p:clrMapOvr>
+  <p:timing>
+    <p:tnLst>
+      <p:par>
+        <p:cTn xmlns:p14="http://schemas.microsoft.com/office/powerpoint/2010/main" id="1" dur="indefinite" restart="never" nodeType="tmRoot"/>
+      </p:par>
+    </p:tnLst>
+  </p:timing>
 </p:sld>
 </file>
 

</xml_diff>